<commit_message>
fin rappel sur le langage c
</commit_message>
<xml_diff>
--- a/POO.pptx
+++ b/POO.pptx
@@ -5,8 +5,11 @@
     <p:sldMasterId id="2147483648" r:id="rId1"/>
   </p:sldMasterIdLst>
   <p:notesMasterIdLst>
-    <p:notesMasterId r:id="rId48"/>
+    <p:notesMasterId r:id="rId54"/>
   </p:notesMasterIdLst>
+  <p:handoutMasterIdLst>
+    <p:handoutMasterId r:id="rId59"/>
+  </p:handoutMasterIdLst>
   <p:sldIdLst>
     <p:sldId id="256" r:id="rId3"/>
     <p:sldId id="257" r:id="rId4"/>
@@ -24,39 +27,45 @@
     <p:sldId id="264" r:id="rId16"/>
     <p:sldId id="308" r:id="rId17"/>
     <p:sldId id="265" r:id="rId18"/>
-    <p:sldId id="266" r:id="rId19"/>
-    <p:sldId id="267" r:id="rId20"/>
-    <p:sldId id="268" r:id="rId21"/>
-    <p:sldId id="269" r:id="rId22"/>
-    <p:sldId id="271" r:id="rId23"/>
-    <p:sldId id="270" r:id="rId24"/>
-    <p:sldId id="272" r:id="rId25"/>
-    <p:sldId id="273" r:id="rId26"/>
-    <p:sldId id="274" r:id="rId27"/>
-    <p:sldId id="276" r:id="rId28"/>
-    <p:sldId id="275" r:id="rId29"/>
-    <p:sldId id="277" r:id="rId30"/>
-    <p:sldId id="278" r:id="rId31"/>
-    <p:sldId id="279" r:id="rId32"/>
-    <p:sldId id="280" r:id="rId33"/>
-    <p:sldId id="281" r:id="rId34"/>
-    <p:sldId id="282" r:id="rId35"/>
-    <p:sldId id="283" r:id="rId36"/>
-    <p:sldId id="284" r:id="rId37"/>
-    <p:sldId id="286" r:id="rId38"/>
-    <p:sldId id="285" r:id="rId39"/>
-    <p:sldId id="287" r:id="rId40"/>
-    <p:sldId id="288" r:id="rId41"/>
-    <p:sldId id="289" r:id="rId42"/>
-    <p:sldId id="290" r:id="rId43"/>
-    <p:sldId id="291" r:id="rId44"/>
-    <p:sldId id="292" r:id="rId45"/>
-    <p:sldId id="293" r:id="rId46"/>
-    <p:sldId id="294" r:id="rId47"/>
-    <p:sldId id="296" r:id="rId49"/>
-    <p:sldId id="295" r:id="rId50"/>
-    <p:sldId id="297" r:id="rId51"/>
-    <p:sldId id="298" r:id="rId52"/>
+    <p:sldId id="347" r:id="rId19"/>
+    <p:sldId id="266" r:id="rId20"/>
+    <p:sldId id="348" r:id="rId21"/>
+    <p:sldId id="267" r:id="rId22"/>
+    <p:sldId id="349" r:id="rId23"/>
+    <p:sldId id="350" r:id="rId24"/>
+    <p:sldId id="268" r:id="rId25"/>
+    <p:sldId id="269" r:id="rId26"/>
+    <p:sldId id="351" r:id="rId27"/>
+    <p:sldId id="352" r:id="rId28"/>
+    <p:sldId id="271" r:id="rId29"/>
+    <p:sldId id="270" r:id="rId30"/>
+    <p:sldId id="272" r:id="rId31"/>
+    <p:sldId id="273" r:id="rId32"/>
+    <p:sldId id="274" r:id="rId33"/>
+    <p:sldId id="276" r:id="rId34"/>
+    <p:sldId id="275" r:id="rId35"/>
+    <p:sldId id="277" r:id="rId36"/>
+    <p:sldId id="278" r:id="rId37"/>
+    <p:sldId id="279" r:id="rId38"/>
+    <p:sldId id="280" r:id="rId39"/>
+    <p:sldId id="281" r:id="rId40"/>
+    <p:sldId id="282" r:id="rId41"/>
+    <p:sldId id="283" r:id="rId42"/>
+    <p:sldId id="284" r:id="rId43"/>
+    <p:sldId id="286" r:id="rId44"/>
+    <p:sldId id="285" r:id="rId45"/>
+    <p:sldId id="287" r:id="rId46"/>
+    <p:sldId id="288" r:id="rId47"/>
+    <p:sldId id="289" r:id="rId48"/>
+    <p:sldId id="290" r:id="rId49"/>
+    <p:sldId id="291" r:id="rId50"/>
+    <p:sldId id="292" r:id="rId51"/>
+    <p:sldId id="293" r:id="rId52"/>
+    <p:sldId id="294" r:id="rId53"/>
+    <p:sldId id="296" r:id="rId55"/>
+    <p:sldId id="295" r:id="rId56"/>
+    <p:sldId id="297" r:id="rId57"/>
+    <p:sldId id="298" r:id="rId58"/>
   </p:sldIdLst>
   <p:sldSz cx="12192000" cy="6858000"/>
   <p:notesSz cx="7103745" cy="10234295"/>
@@ -167,27 +176,33 @@
         <p14:section name="Généralités" id="{f2cac0ad-8b9c-4c22-812e-efaaa331e19b}">
           <p14:sldIdLst>
             <p14:sldId id="262"/>
+            <p14:sldId id="258"/>
             <p14:sldId id="259"/>
-            <p14:sldId id="260"/>
-            <p14:sldId id="258"/>
             <p14:sldId id="303"/>
             <p14:sldId id="304"/>
             <p14:sldId id="305"/>
+            <p14:sldId id="260"/>
           </p14:sldIdLst>
         </p14:section>
         <p14:section name="Rappels sur le langage C" id="{8cfc3c0a-c9cb-43ea-b730-93a1902c19b4}">
           <p14:sldIdLst>
+            <p14:sldId id="261"/>
             <p14:sldId id="263"/>
-            <p14:sldId id="265"/>
-            <p14:sldId id="266"/>
-            <p14:sldId id="267"/>
-            <p14:sldId id="268"/>
-            <p14:sldId id="269"/>
-            <p14:sldId id="261"/>
             <p14:sldId id="306"/>
             <p14:sldId id="307"/>
             <p14:sldId id="264"/>
             <p14:sldId id="308"/>
+            <p14:sldId id="265"/>
+            <p14:sldId id="347"/>
+            <p14:sldId id="266"/>
+            <p14:sldId id="348"/>
+            <p14:sldId id="267"/>
+            <p14:sldId id="349"/>
+            <p14:sldId id="350"/>
+            <p14:sldId id="268"/>
+            <p14:sldId id="269"/>
+            <p14:sldId id="351"/>
+            <p14:sldId id="352"/>
           </p14:sldIdLst>
         </p14:section>
         <p14:section name="Les apports fonctionnels du C++" id="{e171049f-2306-4222-9bf2-11e4af215fb1}">
@@ -239,6 +254,164 @@
     </p:ext>
   </p:extLst>
 </p:presentation>
+</file>
+
+<file path=ppt/handoutMasters/handoutMaster1.xml><?xml version="1.0" encoding="utf-8"?>
+<p:handoutMaster xmlns:a="http://schemas.openxmlformats.org/drawingml/2006/main" xmlns:r="http://schemas.openxmlformats.org/officeDocument/2006/relationships" xmlns:p="http://schemas.openxmlformats.org/presentationml/2006/main">
+  <p:cSld>
+    <p:bg>
+      <p:bgRef idx="1001">
+        <a:schemeClr val="bg1"/>
+      </p:bgRef>
+    </p:bg>
+    <p:spTree>
+      <p:nvGrpSpPr>
+        <p:cNvPr id="1" name=""/>
+        <p:cNvGrpSpPr/>
+        <p:nvPr/>
+      </p:nvGrpSpPr>
+      <p:grpSpPr>
+        <a:xfrm>
+          <a:off x="0" y="0"/>
+          <a:ext cx="0" cy="0"/>
+          <a:chOff x="0" y="0"/>
+          <a:chExt cx="0" cy="0"/>
+        </a:xfrm>
+      </p:grpSpPr>
+      <p:sp>
+        <p:nvSpPr>
+          <p:cNvPr id="2" name="Header Placeholder 1"/>
+          <p:cNvSpPr>
+            <a:spLocks noGrp="1"/>
+          </p:cNvSpPr>
+          <p:nvPr>
+            <p:ph type="hdr" sz="quarter"/>
+          </p:nvPr>
+        </p:nvSpPr>
+        <p:spPr>
+          <a:xfrm>
+            <a:off x="0" y="0"/>
+            <a:ext cx="3078290" cy="513492"/>
+          </a:xfrm>
+          <a:prstGeom prst="rect">
+            <a:avLst/>
+          </a:prstGeom>
+        </p:spPr>
+        <p:txBody>
+          <a:bodyPr vert="horz" lIns="91440" tIns="45720" rIns="91440" bIns="45720" rtlCol="0"/>
+          <a:lstStyle>
+            <a:lvl1pPr algn="l">
+              <a:defRPr sz="1245"/>
+            </a:lvl1pPr>
+          </a:lstStyle>
+          <a:p>
+            <a:endParaRPr lang="en-US"/>
+          </a:p>
+        </p:txBody>
+      </p:sp>
+      <p:sp>
+        <p:nvSpPr>
+          <p:cNvPr id="3" name="Date Placeholder 2"/>
+          <p:cNvSpPr>
+            <a:spLocks noGrp="1"/>
+          </p:cNvSpPr>
+          <p:nvPr>
+            <p:ph type="dt" sz="quarter" idx="1"/>
+          </p:nvPr>
+        </p:nvSpPr>
+        <p:spPr>
+          <a:xfrm>
+            <a:off x="4023812" y="0"/>
+            <a:ext cx="3078290" cy="513492"/>
+          </a:xfrm>
+          <a:prstGeom prst="rect">
+            <a:avLst/>
+          </a:prstGeom>
+        </p:spPr>
+        <p:txBody>
+          <a:bodyPr vert="horz" lIns="91440" tIns="45720" rIns="91440" bIns="45720" rtlCol="0"/>
+          <a:lstStyle>
+            <a:lvl1pPr algn="r">
+              <a:defRPr sz="1245"/>
+            </a:lvl1pPr>
+          </a:lstStyle>
+          <a:p>
+            <a:fld id="{696C064A-D61B-4B21-B757-51A9B82445B8}" type="datetimeFigureOut">
+              <a:rPr lang="en-US" smtClean="0"/>
+            </a:fld>
+            <a:endParaRPr lang="en-US"/>
+          </a:p>
+        </p:txBody>
+      </p:sp>
+      <p:sp>
+        <p:nvSpPr>
+          <p:cNvPr id="4" name="Footer Placeholder 3"/>
+          <p:cNvSpPr>
+            <a:spLocks noGrp="1"/>
+          </p:cNvSpPr>
+          <p:nvPr>
+            <p:ph type="ftr" sz="quarter" idx="2"/>
+          </p:nvPr>
+        </p:nvSpPr>
+        <p:spPr>
+          <a:xfrm>
+            <a:off x="0" y="9720804"/>
+            <a:ext cx="3078290" cy="513491"/>
+          </a:xfrm>
+          <a:prstGeom prst="rect">
+            <a:avLst/>
+          </a:prstGeom>
+        </p:spPr>
+        <p:txBody>
+          <a:bodyPr vert="horz" lIns="91440" tIns="45720" rIns="91440" bIns="45720" rtlCol="0" anchor="b"/>
+          <a:lstStyle>
+            <a:lvl1pPr algn="l">
+              <a:defRPr sz="1245"/>
+            </a:lvl1pPr>
+          </a:lstStyle>
+          <a:p>
+            <a:endParaRPr lang="en-US"/>
+          </a:p>
+        </p:txBody>
+      </p:sp>
+      <p:sp>
+        <p:nvSpPr>
+          <p:cNvPr id="5" name="Slide Number Placeholder 4"/>
+          <p:cNvSpPr>
+            <a:spLocks noGrp="1"/>
+          </p:cNvSpPr>
+          <p:nvPr>
+            <p:ph type="sldNum" sz="quarter" idx="3"/>
+          </p:nvPr>
+        </p:nvSpPr>
+        <p:spPr>
+          <a:xfrm>
+            <a:off x="4023812" y="9720804"/>
+            <a:ext cx="3078290" cy="513491"/>
+          </a:xfrm>
+          <a:prstGeom prst="rect">
+            <a:avLst/>
+          </a:prstGeom>
+        </p:spPr>
+        <p:txBody>
+          <a:bodyPr vert="horz" lIns="91440" tIns="45720" rIns="91440" bIns="45720" rtlCol="0" anchor="b"/>
+          <a:lstStyle>
+            <a:lvl1pPr algn="r">
+              <a:defRPr sz="1245"/>
+            </a:lvl1pPr>
+          </a:lstStyle>
+          <a:p>
+            <a:fld id="{50305E07-67EA-4042-A3F6-853A8AD8D209}" type="slidenum">
+              <a:rPr lang="en-US" smtClean="0"/>
+            </a:fld>
+            <a:endParaRPr lang="en-US"/>
+          </a:p>
+        </p:txBody>
+      </p:sp>
+    </p:spTree>
+  </p:cSld>
+  <p:clrMap bg1="lt1" tx1="dk1" bg2="lt2" tx2="dk2" accent1="accent1" accent2="accent2" accent3="accent3" accent4="accent4" accent5="accent5" accent6="accent6" hlink="hlink" folHlink="folHlink"/>
+</p:handoutMaster>
 </file>
 
 <file path=ppt/notesMasters/notesMaster1.xml><?xml version="1.0" encoding="utf-8"?>
@@ -4091,10 +4264,10 @@
               <a:t>1 - Les variables </a:t>
             </a:r>
             <a:r>
-              <a:rPr lang="" altLang="x-none"/>
+              <a:rPr lang="en-US" altLang="x-none"/>
               <a:t>: les types de données élémentaires</a:t>
             </a:r>
-            <a:endParaRPr lang="" altLang="x-none"/>
+            <a:endParaRPr lang="en-US" altLang="x-none"/>
           </a:p>
         </p:txBody>
       </p:sp>
@@ -4113,66 +4286,66 @@
           <a:bodyPr/>
           <a:p>
             <a:r>
-              <a:rPr lang="" altLang="en-US"/>
+              <a:rPr lang="en-US" altLang="en-US"/>
               <a:t>Nombres entiers</a:t>
             </a:r>
-            <a:endParaRPr lang="" altLang="en-US"/>
+            <a:endParaRPr lang="en-US" altLang="en-US"/>
           </a:p>
           <a:p>
             <a:pPr lvl="1"/>
             <a:r>
-              <a:rPr lang="" altLang="en-US"/>
+              <a:rPr lang="en-US" altLang="en-US"/>
               <a:t>int </a:t>
             </a:r>
-            <a:endParaRPr lang="" altLang="en-US"/>
+            <a:endParaRPr lang="en-US" altLang="en-US"/>
           </a:p>
           <a:p>
             <a:pPr lvl="1"/>
             <a:r>
-              <a:rPr lang="" altLang="en-US"/>
+              <a:rPr lang="en-US" altLang="en-US"/>
               <a:t>long int </a:t>
             </a:r>
-            <a:endParaRPr lang="" altLang="en-US"/>
+            <a:endParaRPr lang="en-US" altLang="en-US"/>
           </a:p>
           <a:p>
             <a:pPr lvl="1"/>
             <a:r>
-              <a:rPr lang="" altLang="en-US"/>
+              <a:rPr lang="en-US" altLang="en-US"/>
               <a:t>short, unsigned</a:t>
             </a:r>
-            <a:endParaRPr lang="" altLang="en-US"/>
+            <a:endParaRPr lang="en-US" altLang="en-US"/>
           </a:p>
           <a:p>
             <a:pPr lvl="0"/>
             <a:r>
-              <a:rPr lang="" altLang="en-US"/>
+              <a:rPr lang="en-US" altLang="en-US"/>
               <a:t>Nombres flottants</a:t>
             </a:r>
-            <a:endParaRPr lang="" altLang="en-US"/>
+            <a:endParaRPr lang="en-US" altLang="en-US"/>
           </a:p>
           <a:p>
             <a:pPr lvl="1"/>
             <a:r>
-              <a:rPr lang="" altLang="en-US"/>
+              <a:rPr lang="en-US" altLang="en-US"/>
               <a:t>float, double et long double</a:t>
             </a:r>
-            <a:endParaRPr lang="" altLang="en-US"/>
+            <a:endParaRPr lang="en-US" altLang="en-US"/>
           </a:p>
           <a:p>
             <a:pPr lvl="0"/>
             <a:r>
-              <a:rPr lang="" altLang="en-US"/>
+              <a:rPr lang="en-US" altLang="en-US"/>
               <a:t>Caractères</a:t>
             </a:r>
-            <a:endParaRPr lang="" altLang="en-US"/>
+            <a:endParaRPr lang="en-US" altLang="en-US"/>
           </a:p>
           <a:p>
             <a:pPr lvl="1"/>
             <a:r>
-              <a:rPr lang="" altLang="en-US"/>
+              <a:rPr lang="en-US" altLang="en-US"/>
               <a:t>char</a:t>
             </a:r>
-            <a:endParaRPr lang="" altLang="en-US"/>
+            <a:endParaRPr lang="en-US" altLang="en-US"/>
           </a:p>
         </p:txBody>
       </p:sp>
@@ -4217,10 +4390,10 @@
               <a:t>: </a:t>
             </a:r>
             <a:r>
-              <a:rPr lang="" altLang="en-US"/>
+              <a:rPr lang="en-US" altLang="en-US"/>
               <a:t>définition d'une variable</a:t>
             </a:r>
-            <a:endParaRPr lang="" altLang="en-US"/>
+            <a:endParaRPr lang="en-US" altLang="en-US"/>
           </a:p>
         </p:txBody>
       </p:sp>
@@ -4242,31 +4415,39 @@
               <a:buNone/>
             </a:pPr>
             <a:r>
-              <a:rPr lang="" altLang="en-US"/>
+              <a:rPr lang="en-US" altLang="en-US"/>
               <a:t>Le langage C impose qu'une variable soit définie avant d'être utilisée. </a:t>
             </a:r>
-            <a:endParaRPr lang="" altLang="en-US"/>
-          </a:p>
-        </p:txBody>
-      </p:sp>
-      <p:sp>
-        <p:nvSpPr>
-          <p:cNvPr id="2" name="Content Placeholder 1"/>
-          <p:cNvSpPr>
-            <a:spLocks noGrp="1"/>
-          </p:cNvSpPr>
+            <a:endParaRPr lang="en-US" altLang="en-US"/>
+          </a:p>
+        </p:txBody>
+      </p:sp>
+      <p:pic>
+        <p:nvPicPr>
+          <p:cNvPr id="7" name="Content Placeholder 6"/>
+          <p:cNvPicPr>
+            <a:picLocks noChangeAspect="1"/>
+          </p:cNvPicPr>
           <p:nvPr>
             <p:ph sz="half" idx="2"/>
           </p:nvPr>
-        </p:nvSpPr>
-        <p:spPr/>
-        <p:txBody>
-          <a:bodyPr/>
-          <a:p>
-            <a:endParaRPr lang="en-US"/>
-          </a:p>
-        </p:txBody>
-      </p:sp>
+        </p:nvPicPr>
+        <p:blipFill>
+          <a:blip r:embed="rId1"/>
+          <a:stretch>
+            <a:fillRect/>
+          </a:stretch>
+        </p:blipFill>
+        <p:spPr>
+          <a:xfrm>
+            <a:off x="6593205" y="2738120"/>
+            <a:ext cx="3781425" cy="1381125"/>
+          </a:xfrm>
+          <a:prstGeom prst="rect">
+            <a:avLst/>
+          </a:prstGeom>
+        </p:spPr>
+      </p:pic>
     </p:spTree>
   </p:cSld>
   <p:clrMapOvr>
@@ -4308,10 +4489,10 @@
               <a:t>: </a:t>
             </a:r>
             <a:r>
-              <a:rPr lang="" altLang="en-US"/>
+              <a:rPr lang="en-US" altLang="en-US"/>
               <a:t>Initialisation d'une variable</a:t>
             </a:r>
-            <a:endParaRPr lang="" altLang="en-US"/>
+            <a:endParaRPr lang="en-US" altLang="en-US"/>
           </a:p>
         </p:txBody>
       </p:sp>
@@ -4333,26 +4514,26 @@
               <a:buNone/>
             </a:pPr>
             <a:r>
-              <a:rPr lang="" altLang="en-US"/>
+              <a:rPr lang="en-US" altLang="en-US"/>
               <a:t>Une variable peut être initialisée lors de sa déclaration</a:t>
             </a:r>
-            <a:endParaRPr lang="" altLang="en-US"/>
+            <a:endParaRPr lang="en-US" altLang="en-US"/>
           </a:p>
           <a:p>
             <a:pPr marL="0" indent="0">
               <a:buNone/>
             </a:pPr>
-            <a:endParaRPr lang="" altLang="en-US"/>
+            <a:endParaRPr lang="en-US" altLang="en-US"/>
           </a:p>
           <a:p>
             <a:pPr marL="0" indent="0">
               <a:buNone/>
             </a:pPr>
             <a:r>
-              <a:rPr lang="" altLang="en-US"/>
+              <a:rPr lang="en-US" altLang="en-US"/>
               <a:t>Une variable d'un type élémentaire non initialisée peut contenir n'importe quelle valeur</a:t>
             </a:r>
-            <a:endParaRPr lang="" altLang="en-US"/>
+            <a:endParaRPr lang="en-US" altLang="en-US"/>
           </a:p>
         </p:txBody>
       </p:sp>
@@ -4410,7 +4591,7 @@
               <a:rPr lang="x-none" altLang="en-US"/>
               <a:t>2 - Les opérateurs </a:t>
             </a:r>
-            <a:endParaRPr lang="" altLang="x-none"/>
+            <a:endParaRPr lang="en-US" altLang="x-none"/>
           </a:p>
         </p:txBody>
       </p:sp>
@@ -4429,66 +4610,66 @@
           <a:bodyPr/>
           <a:p>
             <a:r>
-              <a:rPr lang="" altLang="en-US"/>
+              <a:rPr lang="en-US" altLang="en-US"/>
               <a:t>Les opérateurs arithmétiques</a:t>
             </a:r>
-            <a:endParaRPr lang="" altLang="en-US"/>
+            <a:endParaRPr lang="en-US" altLang="en-US"/>
           </a:p>
           <a:p>
             <a:pPr lvl="1"/>
             <a:r>
-              <a:rPr lang="" altLang="en-US"/>
+              <a:rPr lang="en-US" altLang="en-US"/>
               <a:t>+, -, *, /, %</a:t>
             </a:r>
-            <a:endParaRPr lang="" altLang="en-US"/>
+            <a:endParaRPr lang="en-US" altLang="en-US"/>
           </a:p>
           <a:p>
             <a:pPr lvl="0"/>
             <a:r>
-              <a:rPr lang="" altLang="en-US"/>
+              <a:rPr lang="en-US" altLang="en-US"/>
               <a:t>Les opérateurs de comparaison </a:t>
             </a:r>
-            <a:endParaRPr lang="" altLang="en-US"/>
+            <a:endParaRPr lang="en-US" altLang="en-US"/>
           </a:p>
           <a:p>
             <a:pPr lvl="1"/>
             <a:r>
-              <a:rPr lang="" altLang="en-US"/>
+              <a:rPr lang="en-US" altLang="en-US"/>
               <a:t>&lt;, &lt;=, ==, &gt;, &gt;=, !=</a:t>
             </a:r>
-            <a:endParaRPr lang="" altLang="en-US"/>
+            <a:endParaRPr lang="en-US" altLang="en-US"/>
           </a:p>
           <a:p>
             <a:pPr lvl="0"/>
             <a:r>
-              <a:rPr lang="" altLang="en-US"/>
+              <a:rPr lang="en-US" altLang="en-US"/>
               <a:t>Les opérateurs logiques</a:t>
             </a:r>
-            <a:endParaRPr lang="" altLang="en-US"/>
+            <a:endParaRPr lang="en-US" altLang="en-US"/>
           </a:p>
           <a:p>
             <a:pPr lvl="1"/>
             <a:r>
-              <a:rPr lang="" altLang="en-US"/>
+              <a:rPr lang="en-US" altLang="en-US"/>
               <a:t>&amp;&amp;, ||, !</a:t>
             </a:r>
-            <a:endParaRPr lang="" altLang="en-US"/>
+            <a:endParaRPr lang="en-US" altLang="en-US"/>
           </a:p>
           <a:p>
             <a:pPr lvl="0"/>
             <a:r>
-              <a:rPr lang="" altLang="en-US"/>
+              <a:rPr lang="en-US" altLang="en-US"/>
               <a:t>Les opérateurs bit à bit </a:t>
             </a:r>
-            <a:endParaRPr lang="" altLang="en-US"/>
+            <a:endParaRPr lang="en-US" altLang="en-US"/>
           </a:p>
           <a:p>
             <a:pPr lvl="1"/>
             <a:r>
-              <a:rPr lang="" altLang="en-US"/>
+              <a:rPr lang="en-US" altLang="en-US"/>
               <a:t>&amp;, |, ~</a:t>
             </a:r>
-            <a:endParaRPr lang="" altLang="en-US"/>
+            <a:endParaRPr lang="en-US" altLang="en-US"/>
           </a:p>
         </p:txBody>
       </p:sp>
@@ -4548,18 +4729,14 @@
           <a:p>
             <a:r>
               <a:rPr lang="en-US" altLang="en-US"/>
-              <a:t>Les opérateurs </a:t>
-            </a:r>
-            <a:r>
-              <a:rPr lang="" altLang="en-US"/>
-              <a:t>d'incrémentations </a:t>
+              <a:t>Les opérateurs d'incrémentations </a:t>
             </a:r>
             <a:endParaRPr lang="en-US" altLang="en-US"/>
           </a:p>
           <a:p>
             <a:pPr lvl="1"/>
             <a:r>
-              <a:rPr lang="" altLang="en-US"/>
+              <a:rPr lang="en-US" altLang="en-US"/>
               <a:t>++, +=</a:t>
             </a:r>
             <a:endParaRPr lang="en-US" altLang="en-US"/>
@@ -4567,15 +4744,15 @@
           <a:p>
             <a:pPr lvl="0"/>
             <a:r>
-              <a:rPr lang="" altLang="en-US"/>
+              <a:rPr lang="en-US" altLang="en-US"/>
               <a:t>Les opérateurs de décrémentation</a:t>
             </a:r>
-            <a:endParaRPr lang="" altLang="en-US"/>
+            <a:endParaRPr lang="en-US" altLang="en-US"/>
           </a:p>
           <a:p>
             <a:pPr lvl="1"/>
             <a:r>
-              <a:rPr lang="" altLang="en-US" sz="2800"/>
+              <a:rPr lang="en-US" altLang="en-US" sz="2800"/>
               <a:t>--, -=</a:t>
             </a:r>
             <a:endParaRPr lang="en-US" altLang="en-US"/>
@@ -4583,26 +4760,34 @@
           <a:p>
             <a:pPr lvl="0"/>
             <a:r>
-              <a:rPr lang="" altLang="en-US"/>
+              <a:rPr lang="en-US" altLang="en-US"/>
               <a:t>Les opérateurs ++ et -- ont deux utilisations possibles : </a:t>
             </a:r>
-            <a:endParaRPr lang="" altLang="en-US"/>
+            <a:endParaRPr lang="en-US" altLang="en-US"/>
           </a:p>
           <a:p>
             <a:pPr lvl="1"/>
             <a:r>
-              <a:rPr lang="" altLang="en-US"/>
-              <a:t>Pré-incrémentation : </a:t>
-            </a:r>
-            <a:endParaRPr lang="" altLang="en-US"/>
+              <a:rPr lang="en-US" altLang="en-US"/>
+              <a:t>Pré-incrémentation :  </a:t>
+            </a:r>
+            <a:r>
+              <a:rPr lang="x-none" altLang="en-US"/>
+              <a:t>++var</a:t>
+            </a:r>
+            <a:endParaRPr lang="en-US" altLang="en-US"/>
           </a:p>
           <a:p>
             <a:pPr lvl="1"/>
             <a:r>
-              <a:rPr lang="" altLang="en-US"/>
-              <a:t>Post incrémentation : </a:t>
-            </a:r>
-            <a:endParaRPr lang="" altLang="en-US"/>
+              <a:rPr lang="en-US" altLang="en-US"/>
+              <a:t>Post incrémentation :  </a:t>
+            </a:r>
+            <a:r>
+              <a:rPr lang="x-none" altLang="en-US"/>
+              <a:t>var++</a:t>
+            </a:r>
+            <a:endParaRPr lang="x-none" altLang="en-US"/>
           </a:p>
         </p:txBody>
       </p:sp>
@@ -4640,7 +4825,7 @@
           <a:p>
             <a:r>
               <a:rPr lang="x-none" altLang="en-US"/>
-              <a:t>3 - Les fonctions</a:t>
+              <a:t>3 - Les fonctions - Définition</a:t>
             </a:r>
             <a:endParaRPr lang="x-none" altLang="en-US"/>
           </a:p>
@@ -4648,19 +4833,93 @@
       </p:sp>
       <p:sp>
         <p:nvSpPr>
-          <p:cNvPr id="3" name="Content Placeholder 2"/>
-          <p:cNvSpPr>
-            <a:spLocks noGrp="1"/>
-          </p:cNvSpPr>
+          <p:cNvPr id="9" name="Text Box 8"/>
+          <p:cNvSpPr txBox="1"/>
+          <p:nvPr/>
+        </p:nvSpPr>
+        <p:spPr>
+          <a:xfrm>
+            <a:off x="609600" y="1038225"/>
+            <a:ext cx="9856470" cy="368300"/>
+          </a:xfrm>
+          <a:prstGeom prst="rect">
+            <a:avLst/>
+          </a:prstGeom>
+          <a:noFill/>
+        </p:spPr>
+        <p:txBody>
+          <a:bodyPr wrap="square" rtlCol="0">
+            <a:spAutoFit/>
+          </a:bodyPr>
+          <a:p>
+            <a:r>
+              <a:rPr lang="x-none" altLang="en-US"/>
+              <a:t>Une fonction est définie de la manière suivante : </a:t>
+            </a:r>
+            <a:endParaRPr lang="x-none" altLang="en-US"/>
+          </a:p>
+        </p:txBody>
+      </p:sp>
+      <p:pic>
+        <p:nvPicPr>
+          <p:cNvPr id="10" name="Picture 9"/>
+          <p:cNvPicPr>
+            <a:picLocks noChangeAspect="1"/>
+          </p:cNvPicPr>
+          <p:nvPr/>
+        </p:nvPicPr>
+        <p:blipFill>
+          <a:blip r:embed="rId1"/>
+          <a:stretch>
+            <a:fillRect/>
+          </a:stretch>
+        </p:blipFill>
+        <p:spPr>
+          <a:xfrm>
+            <a:off x="609600" y="1559560"/>
+            <a:ext cx="8885555" cy="361950"/>
+          </a:xfrm>
+          <a:prstGeom prst="rect">
+            <a:avLst/>
+          </a:prstGeom>
+        </p:spPr>
+      </p:pic>
+      <p:sp>
+        <p:nvSpPr>
+          <p:cNvPr id="11" name="Content Placeholder 10"/>
+          <p:cNvSpPr/>
           <p:nvPr>
             <p:ph idx="1"/>
           </p:nvPr>
         </p:nvSpPr>
-        <p:spPr/>
-        <p:txBody>
-          <a:bodyPr/>
-          <a:p>
-            <a:endParaRPr lang="en-US"/>
+        <p:spPr>
+          <a:xfrm>
+            <a:off x="609600" y="2073910"/>
+            <a:ext cx="10972800" cy="4427855"/>
+          </a:xfrm>
+        </p:spPr>
+        <p:txBody>
+          <a:bodyPr/>
+          <a:p>
+            <a:r>
+              <a:rPr lang="x-none" altLang="en-US" sz="1800"/>
+              <a:t>type est le type du résultat de la fonction </a:t>
+            </a:r>
+            <a:endParaRPr lang="x-none" altLang="en-US" sz="1800"/>
+          </a:p>
+          <a:p>
+            <a:r>
+              <a:rPr lang="x-none" altLang="en-US" sz="1800"/>
+              <a:t>Le corpus contient l'ensemble des instructions à effectuer dans la fonction</a:t>
+            </a:r>
+            <a:endParaRPr lang="x-none" altLang="en-US" sz="1800"/>
+          </a:p>
+          <a:p>
+            <a:r>
+              <a:rPr lang="x-none" altLang="en-US" sz="1800"/>
+              <a:t>Si une fonction renvoie un résultat, il doit y avoir au moins une instruction “return expr”</a:t>
+            </a:r>
+            <a:endParaRPr lang="x-none" altLang="en-US" sz="1800"/>
           </a:p>
         </p:txBody>
       </p:sp>
@@ -4698,30 +4957,38 @@
           <a:p>
             <a:r>
               <a:rPr lang="x-none" altLang="en-US"/>
-              <a:t>4 - Flot de compilation et précompilateur</a:t>
+              <a:t>3 - Les fonctions - Exemples</a:t>
             </a:r>
             <a:endParaRPr lang="x-none" altLang="en-US"/>
           </a:p>
         </p:txBody>
       </p:sp>
-      <p:sp>
-        <p:nvSpPr>
-          <p:cNvPr id="3" name="Content Placeholder 2"/>
-          <p:cNvSpPr>
-            <a:spLocks noGrp="1"/>
-          </p:cNvSpPr>
+      <p:pic>
+        <p:nvPicPr>
+          <p:cNvPr id="4" name="Content Placeholder 3"/>
+          <p:cNvPicPr>
+            <a:picLocks noChangeAspect="1"/>
+          </p:cNvPicPr>
           <p:nvPr>
             <p:ph idx="1"/>
           </p:nvPr>
-        </p:nvSpPr>
-        <p:spPr/>
-        <p:txBody>
-          <a:bodyPr/>
-          <a:p>
-            <a:endParaRPr lang="en-US"/>
-          </a:p>
-        </p:txBody>
-      </p:sp>
+        </p:nvPicPr>
+        <p:blipFill>
+          <a:blip r:embed="rId1"/>
+          <a:stretch>
+            <a:fillRect/>
+          </a:stretch>
+        </p:blipFill>
+        <p:spPr>
+          <a:xfrm>
+            <a:off x="861695" y="1792605"/>
+            <a:ext cx="8824595" cy="3809365"/>
+          </a:xfrm>
+          <a:prstGeom prst="rect">
+            <a:avLst/>
+          </a:prstGeom>
+        </p:spPr>
+      </p:pic>
     </p:spTree>
   </p:cSld>
   <p:clrMapOvr>
@@ -4750,13 +5017,18 @@
             <p:ph type="title"/>
           </p:nvPr>
         </p:nvSpPr>
-        <p:spPr/>
+        <p:spPr>
+          <a:xfrm>
+            <a:off x="840105" y="457200"/>
+            <a:ext cx="3932555" cy="953135"/>
+          </a:xfrm>
+        </p:spPr>
         <p:txBody>
           <a:bodyPr/>
           <a:p>
             <a:r>
               <a:rPr lang="x-none" altLang="en-US"/>
-              <a:t>5 - Les pointeurs</a:t>
+              <a:t>4 - Le précompilateur</a:t>
             </a:r>
             <a:endParaRPr lang="x-none" altLang="en-US"/>
           </a:p>
@@ -4764,22 +5036,123 @@
       </p:sp>
       <p:sp>
         <p:nvSpPr>
-          <p:cNvPr id="3" name="Content Placeholder 2"/>
-          <p:cNvSpPr>
-            <a:spLocks noGrp="1"/>
-          </p:cNvSpPr>
+          <p:cNvPr id="5" name="Text Placeholder 4"/>
+          <p:cNvSpPr>
+            <a:spLocks noGrp="1"/>
+          </p:cNvSpPr>
+          <p:nvPr>
+            <p:ph type="body" sz="half" idx="2"/>
+          </p:nvPr>
+        </p:nvSpPr>
+        <p:spPr>
+          <a:xfrm>
+            <a:off x="1125220" y="1948180"/>
+            <a:ext cx="4897120" cy="3811905"/>
+          </a:xfrm>
+        </p:spPr>
+        <p:txBody>
+          <a:bodyPr/>
+          <a:p>
+            <a:pPr marL="285750" indent="-285750">
+              <a:buFont typeface="Arial" panose="02080604020202020204" pitchFamily="34" charset="0"/>
+              <a:buChar char="•"/>
+            </a:pPr>
+            <a:endParaRPr lang="x-none" altLang="en-US" sz="1800"/>
+          </a:p>
+          <a:p>
+            <a:pPr marL="285750" indent="-285750">
+              <a:buFont typeface="Arial" panose="02080604020202020204" pitchFamily="34" charset="0"/>
+              <a:buChar char="•"/>
+            </a:pPr>
+            <a:r>
+              <a:rPr lang="x-none" altLang="en-US" sz="1800"/>
+              <a:t>Le processus de compilation comprend plusieurs étapes</a:t>
+            </a:r>
+            <a:endParaRPr lang="x-none" altLang="en-US" sz="1800"/>
+          </a:p>
+          <a:p>
+            <a:pPr marL="285750" indent="-285750">
+              <a:buFont typeface="Arial" panose="02080604020202020204" pitchFamily="34" charset="0"/>
+              <a:buChar char="•"/>
+            </a:pPr>
+            <a:r>
+              <a:rPr lang="x-none" altLang="en-US" sz="1800"/>
+              <a:t>La première étape est la précompilation </a:t>
+            </a:r>
+            <a:endParaRPr lang="x-none" altLang="en-US" sz="1800"/>
+          </a:p>
+          <a:p>
+            <a:pPr marL="742950" lvl="1" indent="-285750">
+              <a:buFont typeface="Arial" panose="02080604020202020204" pitchFamily="34" charset="0"/>
+              <a:buChar char="•"/>
+            </a:pPr>
+            <a:r>
+              <a:rPr lang="x-none" altLang="en-US" sz="1600"/>
+              <a:t>Inclusion des fichiers </a:t>
+            </a:r>
+            <a:endParaRPr lang="x-none" altLang="en-US" sz="1600"/>
+          </a:p>
+          <a:p>
+            <a:pPr marL="742950" lvl="1" indent="-285750">
+              <a:buFont typeface="Arial" panose="02080604020202020204" pitchFamily="34" charset="0"/>
+              <a:buChar char="•"/>
+            </a:pPr>
+            <a:r>
+              <a:rPr lang="x-none" altLang="en-US" sz="1600"/>
+              <a:t>Suppression ou remplacement de zones de texte</a:t>
+            </a:r>
+            <a:endParaRPr lang="x-none" altLang="en-US" sz="1600"/>
+          </a:p>
+          <a:p>
+            <a:pPr marL="285750" lvl="0" indent="-285750">
+              <a:buFont typeface="Arial" panose="02080604020202020204" pitchFamily="34" charset="0"/>
+              <a:buChar char="•"/>
+            </a:pPr>
+            <a:r>
+              <a:rPr lang="x-none" altLang="en-US" sz="1800"/>
+              <a:t>Le préprocesseur effectue ces opérations séquentiellement</a:t>
+            </a:r>
+            <a:endParaRPr lang="x-none" altLang="en-US" sz="1800"/>
+          </a:p>
+          <a:p>
+            <a:pPr marL="285750" lvl="0" indent="-285750">
+              <a:buFont typeface="Arial" panose="02080604020202020204" pitchFamily="34" charset="0"/>
+              <a:buChar char="•"/>
+            </a:pPr>
+            <a:r>
+              <a:rPr lang="x-none" altLang="en-US" sz="1800"/>
+              <a:t>Son rôle est d'interpréter les directives commençant par “#”</a:t>
+            </a:r>
+            <a:endParaRPr lang="x-none" altLang="en-US" sz="1800"/>
+          </a:p>
+        </p:txBody>
+      </p:sp>
+      <p:pic>
+        <p:nvPicPr>
+          <p:cNvPr id="7" name="Content Placeholder 6" descr="precompilo"/>
+          <p:cNvPicPr>
+            <a:picLocks noChangeAspect="1"/>
+          </p:cNvPicPr>
           <p:nvPr>
             <p:ph idx="1"/>
           </p:nvPr>
-        </p:nvSpPr>
-        <p:spPr/>
-        <p:txBody>
-          <a:bodyPr/>
-          <a:p>
-            <a:endParaRPr lang="en-US"/>
-          </a:p>
-        </p:txBody>
-      </p:sp>
+        </p:nvPicPr>
+        <p:blipFill>
+          <a:blip r:embed="rId1"/>
+          <a:stretch>
+            <a:fillRect/>
+          </a:stretch>
+        </p:blipFill>
+        <p:spPr>
+          <a:xfrm>
+            <a:off x="7474585" y="679450"/>
+            <a:ext cx="2115185" cy="5631180"/>
+          </a:xfrm>
+          <a:prstGeom prst="rect">
+            <a:avLst/>
+          </a:prstGeom>
+        </p:spPr>
+      </p:pic>
     </p:spTree>
   </p:cSld>
   <p:clrMapOvr>
@@ -4808,33 +5181,161 @@
             <p:ph type="title"/>
           </p:nvPr>
         </p:nvSpPr>
-        <p:spPr/>
+        <p:spPr>
+          <a:xfrm>
+            <a:off x="840105" y="457200"/>
+            <a:ext cx="3932555" cy="953135"/>
+          </a:xfrm>
+        </p:spPr>
         <p:txBody>
           <a:bodyPr/>
           <a:p>
             <a:r>
               <a:rPr lang="x-none" altLang="en-US"/>
-              <a:t>6 - Les allocations mémoires</a:t>
+              <a:t>4 - Le précompilateur</a:t>
             </a:r>
             <a:endParaRPr lang="x-none" altLang="en-US"/>
           </a:p>
         </p:txBody>
       </p:sp>
-      <p:sp>
-        <p:nvSpPr>
-          <p:cNvPr id="3" name="Content Placeholder 2"/>
-          <p:cNvSpPr>
-            <a:spLocks noGrp="1"/>
-          </p:cNvSpPr>
+      <p:pic>
+        <p:nvPicPr>
+          <p:cNvPr id="4" name="Picture 3"/>
+          <p:cNvPicPr>
+            <a:picLocks noChangeAspect="1"/>
+          </p:cNvPicPr>
+          <p:nvPr/>
+        </p:nvPicPr>
+        <p:blipFill>
+          <a:blip r:embed="rId1"/>
+          <a:stretch>
+            <a:fillRect/>
+          </a:stretch>
+        </p:blipFill>
+        <p:spPr>
+          <a:xfrm>
+            <a:off x="1282700" y="2051685"/>
+            <a:ext cx="2476500" cy="1000125"/>
+          </a:xfrm>
+          <a:prstGeom prst="rect">
+            <a:avLst/>
+          </a:prstGeom>
+        </p:spPr>
+      </p:pic>
+      <p:pic>
+        <p:nvPicPr>
+          <p:cNvPr id="6" name="Picture 5"/>
+          <p:cNvPicPr>
+            <a:picLocks noChangeAspect="1"/>
+          </p:cNvPicPr>
+          <p:nvPr/>
+        </p:nvPicPr>
+        <p:blipFill>
+          <a:blip r:embed="rId2"/>
+          <a:stretch>
+            <a:fillRect/>
+          </a:stretch>
+        </p:blipFill>
+        <p:spPr>
+          <a:xfrm>
+            <a:off x="840105" y="3404235"/>
+            <a:ext cx="3361690" cy="2790190"/>
+          </a:xfrm>
+          <a:prstGeom prst="rect">
+            <a:avLst/>
+          </a:prstGeom>
+        </p:spPr>
+      </p:pic>
+      <p:pic>
+        <p:nvPicPr>
+          <p:cNvPr id="9" name="Content Placeholder 8"/>
+          <p:cNvPicPr>
+            <a:picLocks noChangeAspect="1"/>
+          </p:cNvPicPr>
           <p:nvPr>
             <p:ph idx="1"/>
           </p:nvPr>
-        </p:nvSpPr>
-        <p:spPr/>
-        <p:txBody>
-          <a:bodyPr/>
-          <a:p>
-            <a:endParaRPr lang="en-US"/>
+        </p:nvPicPr>
+        <p:blipFill>
+          <a:blip r:embed="rId3"/>
+          <a:stretch>
+            <a:fillRect/>
+          </a:stretch>
+        </p:blipFill>
+        <p:spPr>
+          <a:xfrm>
+            <a:off x="6894195" y="2672080"/>
+            <a:ext cx="3781425" cy="2533650"/>
+          </a:xfrm>
+          <a:prstGeom prst="rect">
+            <a:avLst/>
+          </a:prstGeom>
+        </p:spPr>
+      </p:pic>
+      <p:cxnSp>
+        <p:nvCxnSpPr>
+          <p:cNvPr id="10" name="Straight Arrow Connector 9"/>
+          <p:cNvCxnSpPr/>
+          <p:nvPr/>
+        </p:nvCxnSpPr>
+        <p:spPr>
+          <a:xfrm>
+            <a:off x="4406900" y="3812540"/>
+            <a:ext cx="2115820" cy="0"/>
+          </a:xfrm>
+          <a:prstGeom prst="straightConnector1">
+            <a:avLst/>
+          </a:prstGeom>
+          <a:gradFill rotWithShape="0">
+            <a:gsLst>
+              <a:gs pos="0">
+                <a:schemeClr val="accent1"/>
+              </a:gs>
+              <a:gs pos="100000">
+                <a:schemeClr val="accent2"/>
+              </a:gs>
+            </a:gsLst>
+            <a:lin ang="5400000" scaled="1"/>
+          </a:gradFill>
+          <a:ln w="57150" cap="flat" cmpd="sng" algn="ctr">
+            <a:solidFill>
+              <a:schemeClr val="bg1">
+                <a:lumMod val="50000"/>
+              </a:schemeClr>
+            </a:solidFill>
+            <a:prstDash val="solid"/>
+            <a:round/>
+            <a:headEnd type="none" w="med" len="med"/>
+            <a:tailEnd type="arrow" w="med" len="med"/>
+          </a:ln>
+        </p:spPr>
+      </p:cxnSp>
+      <p:sp>
+        <p:nvSpPr>
+          <p:cNvPr id="11" name="Text Box 10"/>
+          <p:cNvSpPr txBox="1"/>
+          <p:nvPr/>
+        </p:nvSpPr>
+        <p:spPr>
+          <a:xfrm>
+            <a:off x="4505325" y="3966210"/>
+            <a:ext cx="1918335" cy="368300"/>
+          </a:xfrm>
+          <a:prstGeom prst="rect">
+            <a:avLst/>
+          </a:prstGeom>
+          <a:noFill/>
+        </p:spPr>
+        <p:txBody>
+          <a:bodyPr wrap="square" rtlCol="0">
+            <a:spAutoFit/>
+          </a:bodyPr>
+          <a:p>
+            <a:r>
+              <a:rPr lang="x-none" altLang="en-US"/>
+              <a:t>Précompilation</a:t>
+            </a:r>
+            <a:endParaRPr lang="x-none" altLang="en-US"/>
           </a:p>
         </p:txBody>
       </p:sp>
@@ -4930,7 +5431,7 @@
           <a:p>
             <a:r>
               <a:rPr lang="x-none" altLang="en-US"/>
-              <a:t>7 - Les structures de données</a:t>
+              <a:t>5 - Les pointeurs</a:t>
             </a:r>
             <a:endParaRPr lang="x-none" altLang="en-US"/>
           </a:p>
@@ -4950,7 +5451,18 @@
         <p:txBody>
           <a:bodyPr/>
           <a:p>
-            <a:endParaRPr lang="en-US"/>
+            <a:r>
+              <a:rPr lang="x-none" altLang="en-US"/>
+              <a:t>Les pointeurs sont des variables qui ne contiennent pas une donnée, mais une adresse mémoire pointant sur une donnée,</a:t>
+            </a:r>
+            <a:endParaRPr lang="x-none" altLang="en-US"/>
+          </a:p>
+          <a:p>
+            <a:r>
+              <a:rPr lang="x-none" altLang="en-US"/>
+              <a:t>Les pointeurs sont utilisés naturellement lorsque l'on manipule des structures, des tableaux, des objets, etc.</a:t>
+            </a:r>
+            <a:endParaRPr lang="x-none" altLang="en-US"/>
           </a:p>
         </p:txBody>
       </p:sp>
@@ -4974,7 +5486,7 @@
       <p:grpSpPr/>
       <p:sp>
         <p:nvSpPr>
-          <p:cNvPr id="4" name="Title 3"/>
+          <p:cNvPr id="24" name="Title 23"/>
           <p:cNvSpPr>
             <a:spLocks noGrp="1"/>
           </p:cNvSpPr>
@@ -4988,30 +5500,36 @@
           <a:p>
             <a:r>
               <a:rPr lang="x-none" altLang="en-US"/>
-              <a:t>III - Les apports fonctionnels du C++</a:t>
+              <a:t>5 - Les pointeurs - Déclaration et accès</a:t>
             </a:r>
             <a:endParaRPr lang="x-none" altLang="en-US"/>
           </a:p>
         </p:txBody>
       </p:sp>
-      <p:sp>
-        <p:nvSpPr>
-          <p:cNvPr id="5" name="Text Placeholder 4"/>
-          <p:cNvSpPr>
-            <a:spLocks noGrp="1"/>
-          </p:cNvSpPr>
-          <p:nvPr>
-            <p:ph type="body" idx="1"/>
-          </p:nvPr>
-        </p:nvSpPr>
-        <p:spPr/>
-        <p:txBody>
-          <a:bodyPr/>
-          <a:p>
-            <a:endParaRPr lang="en-US"/>
-          </a:p>
-        </p:txBody>
-      </p:sp>
+      <p:pic>
+        <p:nvPicPr>
+          <p:cNvPr id="25" name="Picture 24"/>
+          <p:cNvPicPr>
+            <a:picLocks noChangeAspect="1"/>
+          </p:cNvPicPr>
+          <p:nvPr/>
+        </p:nvPicPr>
+        <p:blipFill>
+          <a:blip r:embed="rId1"/>
+          <a:stretch>
+            <a:fillRect/>
+          </a:stretch>
+        </p:blipFill>
+        <p:spPr>
+          <a:xfrm>
+            <a:off x="1541145" y="1276350"/>
+            <a:ext cx="6800850" cy="4305300"/>
+          </a:xfrm>
+          <a:prstGeom prst="rect">
+            <a:avLst/>
+          </a:prstGeom>
+        </p:spPr>
+      </p:pic>
     </p:spTree>
   </p:cSld>
   <p:clrMapOvr>
@@ -5032,7 +5550,7 @@
       <p:grpSpPr/>
       <p:sp>
         <p:nvSpPr>
-          <p:cNvPr id="2" name="Title 1"/>
+          <p:cNvPr id="24" name="Title 23"/>
           <p:cNvSpPr>
             <a:spLocks noGrp="1"/>
           </p:cNvSpPr>
@@ -5046,27 +5564,321 @@
           <a:p>
             <a:r>
               <a:rPr lang="x-none" altLang="en-US"/>
-              <a:t>1 - Inconvénients du langage C</a:t>
+              <a:t>5 - Les pointeurs - Exemple</a:t>
             </a:r>
             <a:endParaRPr lang="x-none" altLang="en-US"/>
           </a:p>
         </p:txBody>
       </p:sp>
-      <p:sp>
-        <p:nvSpPr>
-          <p:cNvPr id="3" name="Content Placeholder 2"/>
-          <p:cNvSpPr>
-            <a:spLocks noGrp="1"/>
-          </p:cNvSpPr>
-          <p:nvPr>
-            <p:ph idx="1"/>
-          </p:nvPr>
-        </p:nvSpPr>
-        <p:spPr/>
-        <p:txBody>
-          <a:bodyPr/>
-          <a:p>
-            <a:endParaRPr lang="en-US"/>
+      <p:pic>
+        <p:nvPicPr>
+          <p:cNvPr id="2" name="Picture 1"/>
+          <p:cNvPicPr>
+            <a:picLocks noChangeAspect="1"/>
+          </p:cNvPicPr>
+          <p:nvPr/>
+        </p:nvPicPr>
+        <p:blipFill>
+          <a:blip r:embed="rId1"/>
+          <a:stretch>
+            <a:fillRect/>
+          </a:stretch>
+        </p:blipFill>
+        <p:spPr>
+          <a:xfrm>
+            <a:off x="609600" y="3386455"/>
+            <a:ext cx="4571365" cy="2045970"/>
+          </a:xfrm>
+          <a:prstGeom prst="rect">
+            <a:avLst/>
+          </a:prstGeom>
+        </p:spPr>
+      </p:pic>
+      <p:graphicFrame>
+        <p:nvGraphicFramePr>
+          <p:cNvPr id="3" name="Table 2"/>
+          <p:cNvGraphicFramePr/>
+          <p:nvPr/>
+        </p:nvGraphicFramePr>
+        <p:xfrm>
+          <a:off x="5705475" y="2781935"/>
+          <a:ext cx="5646420" cy="3254375"/>
+        </p:xfrm>
+        <a:graphic>
+          <a:graphicData uri="http://schemas.openxmlformats.org/drawingml/2006/table">
+            <a:tbl>
+              <a:tblPr firstRow="1" bandRow="1">
+                <a:tableStyleId>{5C22544A-7EE6-4342-B048-85BDC9FD1C3A}</a:tableStyleId>
+              </a:tblPr>
+              <a:tblGrid>
+                <a:gridCol w="1882140"/>
+                <a:gridCol w="1882140"/>
+                <a:gridCol w="1882140"/>
+              </a:tblGrid>
+              <a:tr h="650875">
+                <a:tc>
+                  <a:txBody>
+                    <a:bodyPr/>
+                    <a:p>
+                      <a:pPr>
+                        <a:buNone/>
+                      </a:pPr>
+                      <a:r>
+                        <a:rPr lang="x-none" altLang="en-US"/>
+                        <a:t>Nom</a:t>
+                      </a:r>
+                      <a:endParaRPr lang="x-none" altLang="en-US"/>
+                    </a:p>
+                  </a:txBody>
+                  <a:tcPr/>
+                </a:tc>
+                <a:tc>
+                  <a:txBody>
+                    <a:bodyPr/>
+                    <a:p>
+                      <a:pPr>
+                        <a:buNone/>
+                      </a:pPr>
+                      <a:r>
+                        <a:rPr lang="x-none" altLang="en-US"/>
+                        <a:t>Adresse </a:t>
+                      </a:r>
+                      <a:endParaRPr lang="x-none" altLang="en-US"/>
+                    </a:p>
+                  </a:txBody>
+                  <a:tcPr/>
+                </a:tc>
+                <a:tc>
+                  <a:txBody>
+                    <a:bodyPr/>
+                    <a:p>
+                      <a:pPr>
+                        <a:buNone/>
+                      </a:pPr>
+                      <a:r>
+                        <a:rPr lang="x-none" altLang="en-US"/>
+                        <a:t>Contenu</a:t>
+                      </a:r>
+                      <a:endParaRPr lang="x-none" altLang="en-US"/>
+                    </a:p>
+                  </a:txBody>
+                  <a:tcPr/>
+                </a:tc>
+              </a:tr>
+              <a:tr h="650875">
+                <a:tc>
+                  <a:txBody>
+                    <a:bodyPr/>
+                    <a:p>
+                      <a:pPr>
+                        <a:buNone/>
+                      </a:pPr>
+                      <a:r>
+                        <a:rPr lang="x-none" altLang="en-US"/>
+                        <a:t>var</a:t>
+                      </a:r>
+                      <a:endParaRPr lang="x-none" altLang="en-US"/>
+                    </a:p>
+                  </a:txBody>
+                  <a:tcPr/>
+                </a:tc>
+                <a:tc>
+                  <a:txBody>
+                    <a:bodyPr/>
+                    <a:p>
+                      <a:pPr>
+                        <a:buNone/>
+                      </a:pPr>
+                      <a:r>
+                        <a:rPr lang="x-none" altLang="en-US"/>
+                        <a:t>0x01</a:t>
+                      </a:r>
+                      <a:endParaRPr lang="x-none" altLang="en-US"/>
+                    </a:p>
+                  </a:txBody>
+                  <a:tcPr/>
+                </a:tc>
+                <a:tc>
+                  <a:txBody>
+                    <a:bodyPr/>
+                    <a:p>
+                      <a:pPr>
+                        <a:buNone/>
+                      </a:pPr>
+                      <a:endParaRPr lang="en-US"/>
+                    </a:p>
+                  </a:txBody>
+                  <a:tcPr/>
+                </a:tc>
+              </a:tr>
+              <a:tr h="650875">
+                <a:tc>
+                  <a:txBody>
+                    <a:bodyPr/>
+                    <a:p>
+                      <a:pPr>
+                        <a:buNone/>
+                      </a:pPr>
+                      <a:r>
+                        <a:rPr lang="x-none" altLang="en-US"/>
+                        <a:t>ptr</a:t>
+                      </a:r>
+                      <a:endParaRPr lang="x-none" altLang="en-US"/>
+                    </a:p>
+                  </a:txBody>
+                  <a:tcPr/>
+                </a:tc>
+                <a:tc>
+                  <a:txBody>
+                    <a:bodyPr/>
+                    <a:p>
+                      <a:pPr>
+                        <a:buNone/>
+                      </a:pPr>
+                      <a:r>
+                        <a:rPr lang="x-none" altLang="en-US"/>
+                        <a:t>0x02</a:t>
+                      </a:r>
+                      <a:endParaRPr lang="x-none" altLang="en-US"/>
+                    </a:p>
+                  </a:txBody>
+                  <a:tcPr/>
+                </a:tc>
+                <a:tc>
+                  <a:txBody>
+                    <a:bodyPr/>
+                    <a:p>
+                      <a:pPr>
+                        <a:buNone/>
+                      </a:pPr>
+                      <a:endParaRPr lang="en-US"/>
+                    </a:p>
+                  </a:txBody>
+                  <a:tcPr/>
+                </a:tc>
+              </a:tr>
+              <a:tr h="650875">
+                <a:tc>
+                  <a:txBody>
+                    <a:bodyPr/>
+                    <a:p>
+                      <a:pPr>
+                        <a:buNone/>
+                      </a:pPr>
+                      <a:r>
+                        <a:rPr lang="x-none" altLang="en-US"/>
+                        <a:t>ptrvar</a:t>
+                      </a:r>
+                      <a:endParaRPr lang="x-none" altLang="en-US"/>
+                    </a:p>
+                  </a:txBody>
+                  <a:tcPr/>
+                </a:tc>
+                <a:tc>
+                  <a:txBody>
+                    <a:bodyPr/>
+                    <a:p>
+                      <a:pPr>
+                        <a:buNone/>
+                      </a:pPr>
+                      <a:r>
+                        <a:rPr lang="x-none" altLang="en-US"/>
+                        <a:t>0x03</a:t>
+                      </a:r>
+                      <a:endParaRPr lang="x-none" altLang="en-US"/>
+                    </a:p>
+                  </a:txBody>
+                  <a:tcPr/>
+                </a:tc>
+                <a:tc>
+                  <a:txBody>
+                    <a:bodyPr/>
+                    <a:p>
+                      <a:pPr>
+                        <a:buNone/>
+                      </a:pPr>
+                      <a:endParaRPr lang="en-US"/>
+                    </a:p>
+                  </a:txBody>
+                  <a:tcPr/>
+                </a:tc>
+              </a:tr>
+              <a:tr h="650875">
+                <a:tc>
+                  <a:txBody>
+                    <a:bodyPr/>
+                    <a:p>
+                      <a:pPr>
+                        <a:buNone/>
+                      </a:pPr>
+                      <a:r>
+                        <a:rPr lang="x-none" altLang="en-US"/>
+                        <a:t>var2</a:t>
+                      </a:r>
+                      <a:endParaRPr lang="x-none" altLang="en-US"/>
+                    </a:p>
+                  </a:txBody>
+                  <a:tcPr/>
+                </a:tc>
+                <a:tc>
+                  <a:txBody>
+                    <a:bodyPr/>
+                    <a:p>
+                      <a:pPr>
+                        <a:buNone/>
+                      </a:pPr>
+                      <a:r>
+                        <a:rPr lang="x-none" altLang="en-US"/>
+                        <a:t>0x04</a:t>
+                      </a:r>
+                      <a:endParaRPr lang="x-none" altLang="en-US"/>
+                    </a:p>
+                  </a:txBody>
+                  <a:tcPr/>
+                </a:tc>
+                <a:tc>
+                  <a:txBody>
+                    <a:bodyPr/>
+                    <a:p>
+                      <a:pPr>
+                        <a:buNone/>
+                      </a:pPr>
+                      <a:endParaRPr lang="en-US"/>
+                    </a:p>
+                  </a:txBody>
+                  <a:tcPr/>
+                </a:tc>
+              </a:tr>
+            </a:tbl>
+          </a:graphicData>
+        </a:graphic>
+      </p:graphicFrame>
+      <p:sp>
+        <p:nvSpPr>
+          <p:cNvPr id="4" name="Text Box 3"/>
+          <p:cNvSpPr txBox="1"/>
+          <p:nvPr/>
+        </p:nvSpPr>
+        <p:spPr>
+          <a:xfrm>
+            <a:off x="609600" y="1570355"/>
+            <a:ext cx="9187180" cy="398780"/>
+          </a:xfrm>
+          <a:prstGeom prst="rect">
+            <a:avLst/>
+          </a:prstGeom>
+          <a:noFill/>
+        </p:spPr>
+        <p:txBody>
+          <a:bodyPr wrap="none" rtlCol="0">
+            <a:spAutoFit/>
+          </a:bodyPr>
+          <a:p>
+            <a:r>
+              <a:rPr lang="x-none" altLang="en-US" sz="2000"/>
+              <a:t>A partir du code suivant, déterminer les contenus de chaque variable :</a:t>
+            </a:r>
+            <a:endParaRPr lang="x-none" altLang="en-US" sz="2000"/>
           </a:p>
         </p:txBody>
       </p:sp>
@@ -5104,7 +5916,7 @@
           <a:p>
             <a:r>
               <a:rPr lang="x-none" altLang="en-US"/>
-              <a:t>2 - Les flux d'entrée / sortie</a:t>
+              <a:t>6 - Les allocations mémoires</a:t>
             </a:r>
             <a:endParaRPr lang="x-none" altLang="en-US"/>
           </a:p>
@@ -5162,7 +5974,7 @@
           <a:p>
             <a:r>
               <a:rPr lang="x-none" altLang="en-US"/>
-              <a:t>3 - Les constantes</a:t>
+              <a:t>7 - Les structures de données</a:t>
             </a:r>
             <a:endParaRPr lang="x-none" altLang="en-US"/>
           </a:p>
@@ -5178,14 +5990,54 @@
             <p:ph idx="1"/>
           </p:nvPr>
         </p:nvSpPr>
-        <p:spPr/>
-        <p:txBody>
-          <a:bodyPr/>
-          <a:p>
-            <a:endParaRPr lang="en-US"/>
-          </a:p>
-        </p:txBody>
-      </p:sp>
+        <p:spPr>
+          <a:xfrm>
+            <a:off x="609600" y="1174750"/>
+            <a:ext cx="10972800" cy="1987550"/>
+          </a:xfrm>
+        </p:spPr>
+        <p:txBody>
+          <a:bodyPr/>
+          <a:p>
+            <a:r>
+              <a:rPr lang="x-none" altLang="en-US"/>
+              <a:t>Les structures permettent de regrouper un ensemble de données</a:t>
+            </a:r>
+            <a:endParaRPr lang="x-none" altLang="en-US"/>
+          </a:p>
+          <a:p>
+            <a:r>
+              <a:rPr lang="x-none" altLang="en-US"/>
+              <a:t>La syntaxe est la suivante : </a:t>
+            </a:r>
+            <a:endParaRPr lang="x-none" altLang="en-US"/>
+          </a:p>
+        </p:txBody>
+      </p:sp>
+      <p:pic>
+        <p:nvPicPr>
+          <p:cNvPr id="4" name="Picture 3"/>
+          <p:cNvPicPr>
+            <a:picLocks noChangeAspect="1"/>
+          </p:cNvPicPr>
+          <p:nvPr/>
+        </p:nvPicPr>
+        <p:blipFill>
+          <a:blip r:embed="rId1"/>
+          <a:stretch>
+            <a:fillRect/>
+          </a:stretch>
+        </p:blipFill>
+        <p:spPr>
+          <a:xfrm>
+            <a:off x="3896360" y="4004945"/>
+            <a:ext cx="4399915" cy="1428750"/>
+          </a:xfrm>
+          <a:prstGeom prst="rect">
+            <a:avLst/>
+          </a:prstGeom>
+        </p:spPr>
+      </p:pic>
     </p:spTree>
   </p:cSld>
   <p:clrMapOvr>
@@ -5220,30 +6072,38 @@
           <a:p>
             <a:r>
               <a:rPr lang="x-none" altLang="en-US"/>
-              <a:t>4 - Les espaces de nommage</a:t>
+              <a:t>7 - Les structures de données - Exemple</a:t>
             </a:r>
             <a:endParaRPr lang="x-none" altLang="en-US"/>
           </a:p>
         </p:txBody>
       </p:sp>
-      <p:sp>
-        <p:nvSpPr>
-          <p:cNvPr id="3" name="Content Placeholder 2"/>
-          <p:cNvSpPr>
-            <a:spLocks noGrp="1"/>
-          </p:cNvSpPr>
+      <p:pic>
+        <p:nvPicPr>
+          <p:cNvPr id="6" name="Content Placeholder 5"/>
+          <p:cNvPicPr>
+            <a:picLocks noChangeAspect="1"/>
+          </p:cNvPicPr>
           <p:nvPr>
             <p:ph idx="1"/>
           </p:nvPr>
-        </p:nvSpPr>
-        <p:spPr/>
-        <p:txBody>
-          <a:bodyPr/>
-          <a:p>
-            <a:endParaRPr lang="en-US"/>
-          </a:p>
-        </p:txBody>
-      </p:sp>
+        </p:nvPicPr>
+        <p:blipFill>
+          <a:blip r:embed="rId1"/>
+          <a:stretch>
+            <a:fillRect/>
+          </a:stretch>
+        </p:blipFill>
+        <p:spPr>
+          <a:xfrm>
+            <a:off x="3123565" y="2436495"/>
+            <a:ext cx="5944870" cy="3391535"/>
+          </a:xfrm>
+          <a:prstGeom prst="rect">
+            <a:avLst/>
+          </a:prstGeom>
+        </p:spPr>
+      </p:pic>
     </p:spTree>
   </p:cSld>
   <p:clrMapOvr>
@@ -5264,7 +6124,7 @@
       <p:grpSpPr/>
       <p:sp>
         <p:nvSpPr>
-          <p:cNvPr id="4" name="Title 3"/>
+          <p:cNvPr id="2" name="Title 1"/>
           <p:cNvSpPr>
             <a:spLocks noGrp="1"/>
           </p:cNvSpPr>
@@ -5278,7 +6138,7 @@
           <a:p>
             <a:r>
               <a:rPr lang="x-none" altLang="en-US"/>
-              <a:t>IV - Introduction à la notion d'objet</a:t>
+              <a:t>7 - Les structures de données - Les unions</a:t>
             </a:r>
             <a:endParaRPr lang="x-none" altLang="en-US"/>
           </a:p>
@@ -5291,17 +6151,105 @@
             <a:spLocks noGrp="1"/>
           </p:cNvSpPr>
           <p:nvPr>
-            <p:ph type="body" idx="1"/>
-          </p:nvPr>
-        </p:nvSpPr>
-        <p:spPr/>
-        <p:txBody>
-          <a:bodyPr/>
-          <a:p>
-            <a:endParaRPr lang="en-US"/>
-          </a:p>
-        </p:txBody>
-      </p:sp>
+            <p:ph type="body" sz="half" idx="2"/>
+          </p:nvPr>
+        </p:nvSpPr>
+        <p:spPr/>
+        <p:txBody>
+          <a:bodyPr/>
+          <a:p>
+            <a:pPr marL="285750" indent="-285750">
+              <a:buFont typeface="Arial" panose="02080604020202020204" pitchFamily="34" charset="0"/>
+              <a:buChar char="•"/>
+            </a:pPr>
+            <a:r>
+              <a:rPr lang="x-none" altLang="en-US"/>
+              <a:t>Les unions constituent un type de structure particulier</a:t>
+            </a:r>
+            <a:endParaRPr lang="x-none" altLang="en-US"/>
+          </a:p>
+          <a:p>
+            <a:pPr marL="285750" indent="-285750">
+              <a:buFont typeface="Arial" panose="02080604020202020204" pitchFamily="34" charset="0"/>
+              <a:buChar char="•"/>
+            </a:pPr>
+            <a:endParaRPr lang="x-none" altLang="en-US"/>
+          </a:p>
+          <a:p>
+            <a:pPr marL="285750" indent="-285750">
+              <a:buFont typeface="Arial" panose="02080604020202020204" pitchFamily="34" charset="0"/>
+              <a:buChar char="•"/>
+            </a:pPr>
+            <a:r>
+              <a:rPr lang="x-none" altLang="en-US"/>
+              <a:t>Les champs d'une union sont stockés dans le meme espace mémoire. </a:t>
+            </a:r>
+            <a:endParaRPr lang="x-none" altLang="en-US"/>
+          </a:p>
+          <a:p>
+            <a:pPr marL="742950" lvl="1" indent="-285750">
+              <a:buFont typeface="Arial" panose="02080604020202020204" pitchFamily="34" charset="0"/>
+              <a:buChar char="•"/>
+            </a:pPr>
+            <a:r>
+              <a:rPr lang="x-none" altLang="en-US"/>
+              <a:t>Ecrire dans un champ de l'union écrase donc automatiquement les autres champs</a:t>
+            </a:r>
+            <a:endParaRPr lang="x-none" altLang="en-US"/>
+          </a:p>
+          <a:p>
+            <a:pPr marL="742950" lvl="1" indent="-285750">
+              <a:buFont typeface="Arial" panose="02080604020202020204" pitchFamily="34" charset="0"/>
+              <a:buChar char="•"/>
+            </a:pPr>
+            <a:endParaRPr lang="x-none" altLang="en-US"/>
+          </a:p>
+          <a:p>
+            <a:pPr marL="742950" lvl="1" indent="-285750">
+              <a:buFont typeface="Arial" panose="02080604020202020204" pitchFamily="34" charset="0"/>
+              <a:buChar char="•"/>
+            </a:pPr>
+            <a:endParaRPr lang="x-none" altLang="en-US"/>
+          </a:p>
+          <a:p>
+            <a:pPr marL="285750" lvl="0" indent="-285750">
+              <a:buFont typeface="Arial" panose="02080604020202020204" pitchFamily="34" charset="0"/>
+              <a:buChar char="•"/>
+            </a:pPr>
+            <a:r>
+              <a:rPr lang="x-none" altLang="en-US"/>
+              <a:t>L'utilisation de cette structure permet d'optimiser l'espace mémoire</a:t>
+            </a:r>
+            <a:endParaRPr lang="x-none" altLang="en-US"/>
+          </a:p>
+        </p:txBody>
+      </p:sp>
+      <p:pic>
+        <p:nvPicPr>
+          <p:cNvPr id="7" name="Content Placeholder 6"/>
+          <p:cNvPicPr>
+            <a:picLocks noChangeAspect="1"/>
+          </p:cNvPicPr>
+          <p:nvPr>
+            <p:ph idx="1"/>
+          </p:nvPr>
+        </p:nvPicPr>
+        <p:blipFill>
+          <a:blip r:embed="rId1"/>
+          <a:stretch>
+            <a:fillRect/>
+          </a:stretch>
+        </p:blipFill>
+        <p:spPr>
+          <a:xfrm>
+            <a:off x="5329555" y="1279525"/>
+            <a:ext cx="6781165" cy="4884420"/>
+          </a:xfrm>
+          <a:prstGeom prst="rect">
+            <a:avLst/>
+          </a:prstGeom>
+        </p:spPr>
+      </p:pic>
     </p:spTree>
   </p:cSld>
   <p:clrMapOvr>
@@ -5322,7 +6270,7 @@
       <p:grpSpPr/>
       <p:sp>
         <p:nvSpPr>
-          <p:cNvPr id="2" name="Title 1"/>
+          <p:cNvPr id="4" name="Title 3"/>
           <p:cNvSpPr>
             <a:spLocks noGrp="1"/>
           </p:cNvSpPr>
@@ -5336,7 +6284,7 @@
           <a:p>
             <a:r>
               <a:rPr lang="x-none" altLang="en-US"/>
-              <a:t>1 - Les Objets</a:t>
+              <a:t>III - Les apports fonctionnels du C++</a:t>
             </a:r>
             <a:endParaRPr lang="x-none" altLang="en-US"/>
           </a:p>
@@ -5344,12 +6292,12 @@
       </p:sp>
       <p:sp>
         <p:nvSpPr>
-          <p:cNvPr id="3" name="Content Placeholder 2"/>
-          <p:cNvSpPr>
-            <a:spLocks noGrp="1"/>
-          </p:cNvSpPr>
-          <p:nvPr>
-            <p:ph idx="1"/>
+          <p:cNvPr id="5" name="Text Placeholder 4"/>
+          <p:cNvSpPr>
+            <a:spLocks noGrp="1"/>
+          </p:cNvSpPr>
+          <p:nvPr>
+            <p:ph type="body" idx="1"/>
           </p:nvPr>
         </p:nvSpPr>
         <p:spPr/>
@@ -5394,7 +6342,7 @@
           <a:p>
             <a:r>
               <a:rPr lang="x-none" altLang="en-US"/>
-              <a:t>2 - Structure des classes</a:t>
+              <a:t>1 - Inconvénients du langage C</a:t>
             </a:r>
             <a:endParaRPr lang="x-none" altLang="en-US"/>
           </a:p>
@@ -5410,11 +6358,34 @@
             <p:ph idx="1"/>
           </p:nvPr>
         </p:nvSpPr>
-        <p:spPr/>
-        <p:txBody>
-          <a:bodyPr/>
-          <a:p>
-            <a:endParaRPr lang="en-US"/>
+        <p:spPr>
+          <a:xfrm>
+            <a:off x="609600" y="1174750"/>
+            <a:ext cx="10972800" cy="4953000"/>
+          </a:xfrm>
+        </p:spPr>
+        <p:txBody>
+          <a:bodyPr/>
+          <a:p>
+            <a:r>
+              <a:rPr lang="x-none" altLang="en-US"/>
+              <a:t>Dissociation trop importante des données et des méthodes de traitement</a:t>
+            </a:r>
+            <a:endParaRPr lang="x-none" altLang="en-US"/>
+          </a:p>
+          <a:p>
+            <a:r>
+              <a:rPr lang="x-none" altLang="en-US"/>
+              <a:t>Faible maintenabilité et évolutivité des projets complexes </a:t>
+            </a:r>
+            <a:endParaRPr lang="x-none" altLang="en-US"/>
+          </a:p>
+          <a:p>
+            <a:r>
+              <a:rPr lang="x-none" altLang="en-US"/>
+              <a:t>Comprendre un code en C peut prendre du temps</a:t>
+            </a:r>
+            <a:endParaRPr lang="x-none" altLang="en-US"/>
           </a:p>
         </p:txBody>
       </p:sp>
@@ -5452,27 +6423,86 @@
           <a:p>
             <a:r>
               <a:rPr lang="x-none" altLang="en-US"/>
-              <a:t>3 - Instanciation des classes</a:t>
+              <a:t>2 - Les flux d'entrée / sortie</a:t>
             </a:r>
             <a:endParaRPr lang="x-none" altLang="en-US"/>
           </a:p>
         </p:txBody>
       </p:sp>
-      <p:sp>
-        <p:nvSpPr>
-          <p:cNvPr id="3" name="Content Placeholder 2"/>
-          <p:cNvSpPr>
-            <a:spLocks noGrp="1"/>
-          </p:cNvSpPr>
+      <p:pic>
+        <p:nvPicPr>
+          <p:cNvPr id="4" name="Content Placeholder 3"/>
+          <p:cNvPicPr>
+            <a:picLocks noChangeAspect="1"/>
+          </p:cNvPicPr>
           <p:nvPr>
             <p:ph idx="1"/>
           </p:nvPr>
-        </p:nvSpPr>
-        <p:spPr/>
-        <p:txBody>
-          <a:bodyPr/>
-          <a:p>
-            <a:endParaRPr lang="en-US"/>
+        </p:nvPicPr>
+        <p:blipFill>
+          <a:blip r:embed="rId1"/>
+          <a:stretch>
+            <a:fillRect/>
+          </a:stretch>
+        </p:blipFill>
+        <p:spPr>
+          <a:xfrm>
+            <a:off x="2673985" y="3267710"/>
+            <a:ext cx="5715000" cy="3000375"/>
+          </a:xfrm>
+          <a:prstGeom prst="rect">
+            <a:avLst/>
+          </a:prstGeom>
+        </p:spPr>
+      </p:pic>
+      <p:sp>
+        <p:nvSpPr>
+          <p:cNvPr id="5" name="Text Box 4"/>
+          <p:cNvSpPr txBox="1"/>
+          <p:nvPr/>
+        </p:nvSpPr>
+        <p:spPr>
+          <a:xfrm>
+            <a:off x="609600" y="1416050"/>
+            <a:ext cx="9843770" cy="922020"/>
+          </a:xfrm>
+          <a:prstGeom prst="rect">
+            <a:avLst/>
+          </a:prstGeom>
+          <a:noFill/>
+        </p:spPr>
+        <p:txBody>
+          <a:bodyPr wrap="square" rtlCol="0">
+            <a:spAutoFit/>
+          </a:bodyPr>
+          <a:p>
+            <a:pPr marL="285750" indent="-285750">
+              <a:buFont typeface="Arial" panose="02080604020202020204" pitchFamily="34" charset="0"/>
+              <a:buChar char="•"/>
+            </a:pPr>
+            <a:r>
+              <a:rPr lang="x-none" altLang="en-US"/>
+              <a:t>La gestion des flux d'entrée et de sortie a été revue dans le langage C++</a:t>
+            </a:r>
+            <a:endParaRPr lang="x-none" altLang="en-US"/>
+          </a:p>
+          <a:p>
+            <a:pPr marL="285750" indent="-285750">
+              <a:buFont typeface="Arial" panose="02080604020202020204" pitchFamily="34" charset="0"/>
+              <a:buChar char="•"/>
+            </a:pPr>
+            <a:endParaRPr lang="x-none" altLang="en-US"/>
+          </a:p>
+          <a:p>
+            <a:pPr marL="285750" indent="-285750">
+              <a:buFont typeface="Arial" panose="02080604020202020204" pitchFamily="34" charset="0"/>
+              <a:buChar char="•"/>
+            </a:pPr>
+            <a:r>
+              <a:rPr lang="x-none" altLang="en-US"/>
+              <a:t>L'affichage du message “Hello world” se fait alors de la manière suivante : </a:t>
+            </a:r>
+            <a:endParaRPr lang="x-none" altLang="en-US"/>
           </a:p>
         </p:txBody>
       </p:sp>
@@ -5568,7 +6598,7 @@
           <a:p>
             <a:r>
               <a:rPr lang="x-none" altLang="en-US"/>
-              <a:t>4 - Bonnes manières</a:t>
+              <a:t>3 - Les constantes</a:t>
             </a:r>
             <a:endParaRPr lang="x-none" altLang="en-US"/>
           </a:p>
@@ -5626,7 +6656,7 @@
           <a:p>
             <a:r>
               <a:rPr lang="x-none" altLang="en-US"/>
-              <a:t>5 - Le constructeur</a:t>
+              <a:t>4 - Les espaces de nommage</a:t>
             </a:r>
             <a:endParaRPr lang="x-none" altLang="en-US"/>
           </a:p>
@@ -5670,7 +6700,7 @@
       <p:grpSpPr/>
       <p:sp>
         <p:nvSpPr>
-          <p:cNvPr id="2" name="Title 1"/>
+          <p:cNvPr id="4" name="Title 3"/>
           <p:cNvSpPr>
             <a:spLocks noGrp="1"/>
           </p:cNvSpPr>
@@ -5684,7 +6714,7 @@
           <a:p>
             <a:r>
               <a:rPr lang="x-none" altLang="en-US"/>
-              <a:t>6 - Destructeur</a:t>
+              <a:t>IV - Introduction à la notion d'objet</a:t>
             </a:r>
             <a:endParaRPr lang="x-none" altLang="en-US"/>
           </a:p>
@@ -5692,12 +6722,12 @@
       </p:sp>
       <p:sp>
         <p:nvSpPr>
-          <p:cNvPr id="3" name="Content Placeholder 2"/>
-          <p:cNvSpPr>
-            <a:spLocks noGrp="1"/>
-          </p:cNvSpPr>
-          <p:nvPr>
-            <p:ph idx="1"/>
+          <p:cNvPr id="5" name="Text Placeholder 4"/>
+          <p:cNvSpPr>
+            <a:spLocks noGrp="1"/>
+          </p:cNvSpPr>
+          <p:nvPr>
+            <p:ph type="body" idx="1"/>
           </p:nvPr>
         </p:nvSpPr>
         <p:spPr/>
@@ -5742,7 +6772,7 @@
           <a:p>
             <a:r>
               <a:rPr lang="x-none" altLang="en-US"/>
-              <a:t>7 - Mot clé “static”</a:t>
+              <a:t>1 - Les Objets</a:t>
             </a:r>
             <a:endParaRPr lang="x-none" altLang="en-US"/>
           </a:p>
@@ -5800,7 +6830,7 @@
           <a:p>
             <a:r>
               <a:rPr lang="x-none" altLang="en-US"/>
-              <a:t>8 - Surcharge des fonctions</a:t>
+              <a:t>2 - Structure des classes</a:t>
             </a:r>
             <a:endParaRPr lang="x-none" altLang="en-US"/>
           </a:p>
@@ -5858,7 +6888,7 @@
           <a:p>
             <a:r>
               <a:rPr lang="x-none" altLang="en-US"/>
-              <a:t>9 - Surcharge des opérateurs</a:t>
+              <a:t>3 - Instanciation des classes</a:t>
             </a:r>
             <a:endParaRPr lang="x-none" altLang="en-US"/>
           </a:p>
@@ -5902,7 +6932,7 @@
       <p:grpSpPr/>
       <p:sp>
         <p:nvSpPr>
-          <p:cNvPr id="4" name="Title 3"/>
+          <p:cNvPr id="2" name="Title 1"/>
           <p:cNvSpPr>
             <a:spLocks noGrp="1"/>
           </p:cNvSpPr>
@@ -5916,7 +6946,7 @@
           <a:p>
             <a:r>
               <a:rPr lang="x-none" altLang="en-US"/>
-              <a:t>V - Notions avancées</a:t>
+              <a:t>4 - Bonnes manières</a:t>
             </a:r>
             <a:endParaRPr lang="x-none" altLang="en-US"/>
           </a:p>
@@ -5924,12 +6954,12 @@
       </p:sp>
       <p:sp>
         <p:nvSpPr>
-          <p:cNvPr id="5" name="Text Placeholder 4"/>
-          <p:cNvSpPr>
-            <a:spLocks noGrp="1"/>
-          </p:cNvSpPr>
-          <p:nvPr>
-            <p:ph type="body" idx="1"/>
+          <p:cNvPr id="3" name="Content Placeholder 2"/>
+          <p:cNvSpPr>
+            <a:spLocks noGrp="1"/>
+          </p:cNvSpPr>
+          <p:nvPr>
+            <p:ph idx="1"/>
           </p:nvPr>
         </p:nvSpPr>
         <p:spPr/>
@@ -5960,7 +6990,7 @@
       <p:grpSpPr/>
       <p:sp>
         <p:nvSpPr>
-          <p:cNvPr id="6" name="Title 5"/>
+          <p:cNvPr id="2" name="Title 1"/>
           <p:cNvSpPr>
             <a:spLocks noGrp="1"/>
           </p:cNvSpPr>
@@ -5974,7 +7004,7 @@
           <a:p>
             <a:r>
               <a:rPr lang="x-none" altLang="en-US"/>
-              <a:t>1 - Encapsulation des données</a:t>
+              <a:t>5 - Le constructeur</a:t>
             </a:r>
             <a:endParaRPr lang="x-none" altLang="en-US"/>
           </a:p>
@@ -5982,7 +7012,7 @@
       </p:sp>
       <p:sp>
         <p:nvSpPr>
-          <p:cNvPr id="7" name="Content Placeholder 6"/>
+          <p:cNvPr id="3" name="Content Placeholder 2"/>
           <p:cNvSpPr>
             <a:spLocks noGrp="1"/>
           </p:cNvSpPr>
@@ -6032,7 +7062,7 @@
           <a:p>
             <a:r>
               <a:rPr lang="x-none" altLang="en-US"/>
-              <a:t>2 - Les droits d'accès</a:t>
+              <a:t>6 - Destructeur</a:t>
             </a:r>
             <a:endParaRPr lang="x-none" altLang="en-US"/>
           </a:p>
@@ -6090,7 +7120,7 @@
           <a:p>
             <a:r>
               <a:rPr lang="x-none" altLang="en-US"/>
-              <a:t>3 - Héritage et dérivation</a:t>
+              <a:t>7 - Mot clé “static”</a:t>
             </a:r>
             <a:endParaRPr lang="x-none" altLang="en-US"/>
           </a:p>
@@ -6169,24 +7199,24 @@
           <a:bodyPr/>
           <a:p>
             <a:r>
-              <a:rPr lang="" altLang="en-US"/>
+              <a:rPr lang="en-US" altLang="en-US"/>
               <a:t>S'initier aux concepts et principes de base de la programmation orientée objet</a:t>
             </a:r>
-            <a:endParaRPr lang="" altLang="en-US"/>
-          </a:p>
-          <a:p>
-            <a:r>
-              <a:rPr lang="" altLang="en-US"/>
+            <a:endParaRPr lang="en-US" altLang="en-US"/>
+          </a:p>
+          <a:p>
+            <a:r>
+              <a:rPr lang="en-US" altLang="en-US"/>
               <a:t>Découvrir les spécificités du langage C++</a:t>
             </a:r>
-            <a:endParaRPr lang="" altLang="en-US"/>
-          </a:p>
-          <a:p>
-            <a:r>
-              <a:rPr lang="" altLang="en-US"/>
+            <a:endParaRPr lang="en-US" altLang="en-US"/>
+          </a:p>
+          <a:p>
+            <a:r>
+              <a:rPr lang="en-US" altLang="en-US"/>
               <a:t>Maîtriser les bonnes pratiques du langage, afin d'améliorer la fiabilité et la réutilisation des logiciels</a:t>
             </a:r>
-            <a:endParaRPr lang="" altLang="en-US"/>
+            <a:endParaRPr lang="en-US" altLang="en-US"/>
           </a:p>
         </p:txBody>
       </p:sp>
@@ -6224,7 +7254,7 @@
           <a:p>
             <a:r>
               <a:rPr lang="x-none" altLang="en-US"/>
-              <a:t>4 - Héritage multiple</a:t>
+              <a:t>8 - Surcharge des fonctions</a:t>
             </a:r>
             <a:endParaRPr lang="x-none" altLang="en-US"/>
           </a:p>
@@ -6282,7 +7312,7 @@
           <a:p>
             <a:r>
               <a:rPr lang="x-none" altLang="en-US"/>
-              <a:t>5 - Compatibilité des classes</a:t>
+              <a:t>9 - Surcharge des opérateurs</a:t>
             </a:r>
             <a:endParaRPr lang="x-none" altLang="en-US"/>
           </a:p>
@@ -6326,7 +7356,7 @@
       <p:grpSpPr/>
       <p:sp>
         <p:nvSpPr>
-          <p:cNvPr id="2" name="Title 1"/>
+          <p:cNvPr id="4" name="Title 3"/>
           <p:cNvSpPr>
             <a:spLocks noGrp="1"/>
           </p:cNvSpPr>
@@ -6340,7 +7370,7 @@
           <a:p>
             <a:r>
               <a:rPr lang="x-none" altLang="en-US"/>
-              <a:t>6 - Classes abstraites</a:t>
+              <a:t>V - Notions avancées</a:t>
             </a:r>
             <a:endParaRPr lang="x-none" altLang="en-US"/>
           </a:p>
@@ -6348,12 +7378,12 @@
       </p:sp>
       <p:sp>
         <p:nvSpPr>
-          <p:cNvPr id="3" name="Content Placeholder 2"/>
-          <p:cNvSpPr>
-            <a:spLocks noGrp="1"/>
-          </p:cNvSpPr>
-          <p:nvPr>
-            <p:ph idx="1"/>
+          <p:cNvPr id="5" name="Text Placeholder 4"/>
+          <p:cNvSpPr>
+            <a:spLocks noGrp="1"/>
+          </p:cNvSpPr>
+          <p:nvPr>
+            <p:ph type="body" idx="1"/>
           </p:nvPr>
         </p:nvSpPr>
         <p:spPr/>
@@ -6384,7 +7414,7 @@
       <p:grpSpPr/>
       <p:sp>
         <p:nvSpPr>
-          <p:cNvPr id="2" name="Title 1"/>
+          <p:cNvPr id="6" name="Title 5"/>
           <p:cNvSpPr>
             <a:spLocks noGrp="1"/>
           </p:cNvSpPr>
@@ -6398,7 +7428,7 @@
           <a:p>
             <a:r>
               <a:rPr lang="x-none" altLang="en-US"/>
-              <a:t>7 - Exceptions</a:t>
+              <a:t>1 - Encapsulation des données</a:t>
             </a:r>
             <a:endParaRPr lang="x-none" altLang="en-US"/>
           </a:p>
@@ -6406,7 +7436,7 @@
       </p:sp>
       <p:sp>
         <p:nvSpPr>
-          <p:cNvPr id="3" name="Content Placeholder 2"/>
+          <p:cNvPr id="7" name="Content Placeholder 6"/>
           <p:cNvSpPr>
             <a:spLocks noGrp="1"/>
           </p:cNvSpPr>
@@ -6456,7 +7486,7 @@
           <a:p>
             <a:r>
               <a:rPr lang="x-none" altLang="en-US"/>
-              <a:t>8 - Flux</a:t>
+              <a:t>2 - Les droits d'accès</a:t>
             </a:r>
             <a:endParaRPr lang="x-none" altLang="en-US"/>
           </a:p>
@@ -6514,7 +7544,7 @@
           <a:p>
             <a:r>
               <a:rPr lang="x-none" altLang="en-US"/>
-              <a:t>9 - Templates</a:t>
+              <a:t>3 - Héritage et dérivation</a:t>
             </a:r>
             <a:endParaRPr lang="x-none" altLang="en-US"/>
           </a:p>
@@ -6558,7 +7588,7 @@
       <p:grpSpPr/>
       <p:sp>
         <p:nvSpPr>
-          <p:cNvPr id="4" name="Title 3"/>
+          <p:cNvPr id="2" name="Title 1"/>
           <p:cNvSpPr>
             <a:spLocks noGrp="1"/>
           </p:cNvSpPr>
@@ -6572,7 +7602,7 @@
           <a:p>
             <a:r>
               <a:rPr lang="x-none" altLang="en-US"/>
-              <a:t>VI - Les bibliothèques</a:t>
+              <a:t>4 - Héritage multiple</a:t>
             </a:r>
             <a:endParaRPr lang="x-none" altLang="en-US"/>
           </a:p>
@@ -6580,12 +7610,12 @@
       </p:sp>
       <p:sp>
         <p:nvSpPr>
-          <p:cNvPr id="5" name="Text Placeholder 4"/>
-          <p:cNvSpPr>
-            <a:spLocks noGrp="1"/>
-          </p:cNvSpPr>
-          <p:nvPr>
-            <p:ph type="body" idx="1"/>
+          <p:cNvPr id="3" name="Content Placeholder 2"/>
+          <p:cNvSpPr>
+            <a:spLocks noGrp="1"/>
+          </p:cNvSpPr>
+          <p:nvPr>
+            <p:ph idx="1"/>
           </p:nvPr>
         </p:nvSpPr>
         <p:spPr/>
@@ -6616,7 +7646,7 @@
       <p:grpSpPr/>
       <p:sp>
         <p:nvSpPr>
-          <p:cNvPr id="4" name="Title 3"/>
+          <p:cNvPr id="2" name="Title 1"/>
           <p:cNvSpPr>
             <a:spLocks noGrp="1"/>
           </p:cNvSpPr>
@@ -6630,7 +7660,7 @@
           <a:p>
             <a:r>
               <a:rPr lang="x-none" altLang="en-US"/>
-              <a:t>1 - Librairie standard (STL)</a:t>
+              <a:t>5 - Compatibilité des classes</a:t>
             </a:r>
             <a:endParaRPr lang="x-none" altLang="en-US"/>
           </a:p>
@@ -6638,7 +7668,7 @@
       </p:sp>
       <p:sp>
         <p:nvSpPr>
-          <p:cNvPr id="6" name="Content Placeholder 5"/>
+          <p:cNvPr id="3" name="Content Placeholder 2"/>
           <p:cNvSpPr>
             <a:spLocks noGrp="1"/>
           </p:cNvSpPr>
@@ -6688,7 +7718,7 @@
           <a:p>
             <a:r>
               <a:rPr lang="x-none" altLang="en-US"/>
-              <a:t>2 - Les spécificités du C++11</a:t>
+              <a:t>6 - Classes abstraites</a:t>
             </a:r>
             <a:endParaRPr lang="x-none" altLang="en-US"/>
           </a:p>
@@ -6746,7 +7776,7 @@
           <a:p>
             <a:r>
               <a:rPr lang="x-none" altLang="en-US"/>
-              <a:t>3 - Qt</a:t>
+              <a:t>7 - Exceptions</a:t>
             </a:r>
             <a:endParaRPr lang="x-none" altLang="en-US"/>
           </a:p>
@@ -6804,13 +7834,13 @@
           <a:p>
             <a:r>
               <a:rPr lang="x-none" altLang="en-US"/>
-              <a:t>2 - Evolution de l'informatique </a:t>
-            </a:r>
-            <a:r>
-              <a:rPr lang="" altLang="x-none"/>
+              <a:t>2 - Évolution de l'informatique </a:t>
+            </a:r>
+            <a:r>
+              <a:rPr lang="en-US" altLang="x-none"/>
               <a:t>: évolution de la complexité des logiciels</a:t>
             </a:r>
-            <a:endParaRPr lang="" altLang="x-none"/>
+            <a:endParaRPr lang="en-US" altLang="x-none"/>
           </a:p>
         </p:txBody>
       </p:sp>
@@ -6832,34 +7862,382 @@
               <a:buNone/>
             </a:pPr>
             <a:r>
-              <a:rPr lang="" altLang="en-US"/>
+              <a:rPr lang="en-US" altLang="en-US"/>
               <a:t>Depuis les débuts de l'informatique, la complexité des logiciels augmentent de manière exponentielle</a:t>
             </a:r>
-            <a:endParaRPr lang="" altLang="en-US"/>
+            <a:endParaRPr lang="en-US" altLang="en-US"/>
           </a:p>
           <a:p>
             <a:pPr marL="0" indent="0">
               <a:buNone/>
             </a:pPr>
             <a:r>
-              <a:rPr lang="" altLang="en-US"/>
-              <a:t>Ce fait est rendu possible grace : </a:t>
-            </a:r>
-            <a:endParaRPr lang="" altLang="en-US"/>
-          </a:p>
-          <a:p>
-            <a:r>
-              <a:rPr lang="" altLang="en-US"/>
+              <a:rPr lang="en-US" altLang="en-US"/>
+              <a:t>Ce fait est rendu possible grâce : </a:t>
+            </a:r>
+            <a:endParaRPr lang="en-US" altLang="en-US"/>
+          </a:p>
+          <a:p>
+            <a:r>
+              <a:rPr lang="en-US" altLang="en-US"/>
               <a:t>A l'augmentation de la puissance de calcul</a:t>
             </a:r>
-            <a:endParaRPr lang="" altLang="en-US"/>
-          </a:p>
-          <a:p>
-            <a:r>
-              <a:rPr lang="" altLang="en-US"/>
+            <a:endParaRPr lang="en-US" altLang="en-US"/>
+          </a:p>
+          <a:p>
+            <a:r>
+              <a:rPr lang="en-US" altLang="en-US"/>
               <a:t>A l'évolution des langages informatiques</a:t>
             </a:r>
-            <a:endParaRPr lang="" altLang="en-US"/>
+            <a:endParaRPr lang="en-US" altLang="en-US"/>
+          </a:p>
+        </p:txBody>
+      </p:sp>
+    </p:spTree>
+  </p:cSld>
+  <p:clrMapOvr>
+    <a:masterClrMapping/>
+  </p:clrMapOvr>
+</p:sld>
+</file>
+
+<file path=ppt/slides/slide50.xml><?xml version="1.0" encoding="utf-8"?>
+<p:sld xmlns:a="http://schemas.openxmlformats.org/drawingml/2006/main" xmlns:r="http://schemas.openxmlformats.org/officeDocument/2006/relationships" xmlns:p="http://schemas.openxmlformats.org/presentationml/2006/main">
+  <p:cSld>
+    <p:spTree>
+      <p:nvGrpSpPr>
+        <p:cNvPr id="1" name=""/>
+        <p:cNvGrpSpPr/>
+        <p:nvPr/>
+      </p:nvGrpSpPr>
+      <p:grpSpPr/>
+      <p:sp>
+        <p:nvSpPr>
+          <p:cNvPr id="2" name="Title 1"/>
+          <p:cNvSpPr>
+            <a:spLocks noGrp="1"/>
+          </p:cNvSpPr>
+          <p:nvPr>
+            <p:ph type="title"/>
+          </p:nvPr>
+        </p:nvSpPr>
+        <p:spPr/>
+        <p:txBody>
+          <a:bodyPr/>
+          <a:p>
+            <a:r>
+              <a:rPr lang="x-none" altLang="en-US"/>
+              <a:t>8 - Flux</a:t>
+            </a:r>
+            <a:endParaRPr lang="x-none" altLang="en-US"/>
+          </a:p>
+        </p:txBody>
+      </p:sp>
+      <p:sp>
+        <p:nvSpPr>
+          <p:cNvPr id="3" name="Content Placeholder 2"/>
+          <p:cNvSpPr>
+            <a:spLocks noGrp="1"/>
+          </p:cNvSpPr>
+          <p:nvPr>
+            <p:ph idx="1"/>
+          </p:nvPr>
+        </p:nvSpPr>
+        <p:spPr/>
+        <p:txBody>
+          <a:bodyPr/>
+          <a:p>
+            <a:endParaRPr lang="en-US"/>
+          </a:p>
+        </p:txBody>
+      </p:sp>
+    </p:spTree>
+  </p:cSld>
+  <p:clrMapOvr>
+    <a:masterClrMapping/>
+  </p:clrMapOvr>
+</p:sld>
+</file>
+
+<file path=ppt/slides/slide51.xml><?xml version="1.0" encoding="utf-8"?>
+<p:sld xmlns:a="http://schemas.openxmlformats.org/drawingml/2006/main" xmlns:r="http://schemas.openxmlformats.org/officeDocument/2006/relationships" xmlns:p="http://schemas.openxmlformats.org/presentationml/2006/main">
+  <p:cSld>
+    <p:spTree>
+      <p:nvGrpSpPr>
+        <p:cNvPr id="1" name=""/>
+        <p:cNvGrpSpPr/>
+        <p:nvPr/>
+      </p:nvGrpSpPr>
+      <p:grpSpPr/>
+      <p:sp>
+        <p:nvSpPr>
+          <p:cNvPr id="2" name="Title 1"/>
+          <p:cNvSpPr>
+            <a:spLocks noGrp="1"/>
+          </p:cNvSpPr>
+          <p:nvPr>
+            <p:ph type="title"/>
+          </p:nvPr>
+        </p:nvSpPr>
+        <p:spPr/>
+        <p:txBody>
+          <a:bodyPr/>
+          <a:p>
+            <a:r>
+              <a:rPr lang="x-none" altLang="en-US"/>
+              <a:t>9 - Templates</a:t>
+            </a:r>
+            <a:endParaRPr lang="x-none" altLang="en-US"/>
+          </a:p>
+        </p:txBody>
+      </p:sp>
+      <p:sp>
+        <p:nvSpPr>
+          <p:cNvPr id="3" name="Content Placeholder 2"/>
+          <p:cNvSpPr>
+            <a:spLocks noGrp="1"/>
+          </p:cNvSpPr>
+          <p:nvPr>
+            <p:ph idx="1"/>
+          </p:nvPr>
+        </p:nvSpPr>
+        <p:spPr/>
+        <p:txBody>
+          <a:bodyPr/>
+          <a:p>
+            <a:endParaRPr lang="en-US"/>
+          </a:p>
+        </p:txBody>
+      </p:sp>
+    </p:spTree>
+  </p:cSld>
+  <p:clrMapOvr>
+    <a:masterClrMapping/>
+  </p:clrMapOvr>
+</p:sld>
+</file>
+
+<file path=ppt/slides/slide52.xml><?xml version="1.0" encoding="utf-8"?>
+<p:sld xmlns:a="http://schemas.openxmlformats.org/drawingml/2006/main" xmlns:r="http://schemas.openxmlformats.org/officeDocument/2006/relationships" xmlns:p="http://schemas.openxmlformats.org/presentationml/2006/main">
+  <p:cSld>
+    <p:spTree>
+      <p:nvGrpSpPr>
+        <p:cNvPr id="1" name=""/>
+        <p:cNvGrpSpPr/>
+        <p:nvPr/>
+      </p:nvGrpSpPr>
+      <p:grpSpPr/>
+      <p:sp>
+        <p:nvSpPr>
+          <p:cNvPr id="4" name="Title 3"/>
+          <p:cNvSpPr>
+            <a:spLocks noGrp="1"/>
+          </p:cNvSpPr>
+          <p:nvPr>
+            <p:ph type="title"/>
+          </p:nvPr>
+        </p:nvSpPr>
+        <p:spPr/>
+        <p:txBody>
+          <a:bodyPr/>
+          <a:p>
+            <a:r>
+              <a:rPr lang="x-none" altLang="en-US"/>
+              <a:t>VI - Les bibliothèques</a:t>
+            </a:r>
+            <a:endParaRPr lang="x-none" altLang="en-US"/>
+          </a:p>
+        </p:txBody>
+      </p:sp>
+      <p:sp>
+        <p:nvSpPr>
+          <p:cNvPr id="5" name="Text Placeholder 4"/>
+          <p:cNvSpPr>
+            <a:spLocks noGrp="1"/>
+          </p:cNvSpPr>
+          <p:nvPr>
+            <p:ph type="body" idx="1"/>
+          </p:nvPr>
+        </p:nvSpPr>
+        <p:spPr/>
+        <p:txBody>
+          <a:bodyPr/>
+          <a:p>
+            <a:endParaRPr lang="en-US"/>
+          </a:p>
+        </p:txBody>
+      </p:sp>
+    </p:spTree>
+  </p:cSld>
+  <p:clrMapOvr>
+    <a:masterClrMapping/>
+  </p:clrMapOvr>
+</p:sld>
+</file>
+
+<file path=ppt/slides/slide53.xml><?xml version="1.0" encoding="utf-8"?>
+<p:sld xmlns:a="http://schemas.openxmlformats.org/drawingml/2006/main" xmlns:r="http://schemas.openxmlformats.org/officeDocument/2006/relationships" xmlns:p="http://schemas.openxmlformats.org/presentationml/2006/main">
+  <p:cSld>
+    <p:spTree>
+      <p:nvGrpSpPr>
+        <p:cNvPr id="1" name=""/>
+        <p:cNvGrpSpPr/>
+        <p:nvPr/>
+      </p:nvGrpSpPr>
+      <p:grpSpPr/>
+      <p:sp>
+        <p:nvSpPr>
+          <p:cNvPr id="4" name="Title 3"/>
+          <p:cNvSpPr>
+            <a:spLocks noGrp="1"/>
+          </p:cNvSpPr>
+          <p:nvPr>
+            <p:ph type="title"/>
+          </p:nvPr>
+        </p:nvSpPr>
+        <p:spPr/>
+        <p:txBody>
+          <a:bodyPr/>
+          <a:p>
+            <a:r>
+              <a:rPr lang="x-none" altLang="en-US"/>
+              <a:t>1 - Librairie standard (STL)</a:t>
+            </a:r>
+            <a:endParaRPr lang="x-none" altLang="en-US"/>
+          </a:p>
+        </p:txBody>
+      </p:sp>
+      <p:sp>
+        <p:nvSpPr>
+          <p:cNvPr id="6" name="Content Placeholder 5"/>
+          <p:cNvSpPr>
+            <a:spLocks noGrp="1"/>
+          </p:cNvSpPr>
+          <p:nvPr>
+            <p:ph idx="1"/>
+          </p:nvPr>
+        </p:nvSpPr>
+        <p:spPr/>
+        <p:txBody>
+          <a:bodyPr/>
+          <a:p>
+            <a:endParaRPr lang="en-US"/>
+          </a:p>
+        </p:txBody>
+      </p:sp>
+    </p:spTree>
+  </p:cSld>
+  <p:clrMapOvr>
+    <a:masterClrMapping/>
+  </p:clrMapOvr>
+</p:sld>
+</file>
+
+<file path=ppt/slides/slide54.xml><?xml version="1.0" encoding="utf-8"?>
+<p:sld xmlns:a="http://schemas.openxmlformats.org/drawingml/2006/main" xmlns:r="http://schemas.openxmlformats.org/officeDocument/2006/relationships" xmlns:p="http://schemas.openxmlformats.org/presentationml/2006/main">
+  <p:cSld>
+    <p:spTree>
+      <p:nvGrpSpPr>
+        <p:cNvPr id="1" name=""/>
+        <p:cNvGrpSpPr/>
+        <p:nvPr/>
+      </p:nvGrpSpPr>
+      <p:grpSpPr/>
+      <p:sp>
+        <p:nvSpPr>
+          <p:cNvPr id="2" name="Title 1"/>
+          <p:cNvSpPr>
+            <a:spLocks noGrp="1"/>
+          </p:cNvSpPr>
+          <p:nvPr>
+            <p:ph type="title"/>
+          </p:nvPr>
+        </p:nvSpPr>
+        <p:spPr/>
+        <p:txBody>
+          <a:bodyPr/>
+          <a:p>
+            <a:r>
+              <a:rPr lang="x-none" altLang="en-US"/>
+              <a:t>2 - Les spécificités du C++11</a:t>
+            </a:r>
+            <a:endParaRPr lang="x-none" altLang="en-US"/>
+          </a:p>
+        </p:txBody>
+      </p:sp>
+      <p:sp>
+        <p:nvSpPr>
+          <p:cNvPr id="3" name="Content Placeholder 2"/>
+          <p:cNvSpPr>
+            <a:spLocks noGrp="1"/>
+          </p:cNvSpPr>
+          <p:nvPr>
+            <p:ph idx="1"/>
+          </p:nvPr>
+        </p:nvSpPr>
+        <p:spPr/>
+        <p:txBody>
+          <a:bodyPr/>
+          <a:p>
+            <a:endParaRPr lang="en-US"/>
+          </a:p>
+        </p:txBody>
+      </p:sp>
+    </p:spTree>
+  </p:cSld>
+  <p:clrMapOvr>
+    <a:masterClrMapping/>
+  </p:clrMapOvr>
+</p:sld>
+</file>
+
+<file path=ppt/slides/slide55.xml><?xml version="1.0" encoding="utf-8"?>
+<p:sld xmlns:a="http://schemas.openxmlformats.org/drawingml/2006/main" xmlns:r="http://schemas.openxmlformats.org/officeDocument/2006/relationships" xmlns:p="http://schemas.openxmlformats.org/presentationml/2006/main">
+  <p:cSld>
+    <p:spTree>
+      <p:nvGrpSpPr>
+        <p:cNvPr id="1" name=""/>
+        <p:cNvGrpSpPr/>
+        <p:nvPr/>
+      </p:nvGrpSpPr>
+      <p:grpSpPr/>
+      <p:sp>
+        <p:nvSpPr>
+          <p:cNvPr id="2" name="Title 1"/>
+          <p:cNvSpPr>
+            <a:spLocks noGrp="1"/>
+          </p:cNvSpPr>
+          <p:nvPr>
+            <p:ph type="title"/>
+          </p:nvPr>
+        </p:nvSpPr>
+        <p:spPr/>
+        <p:txBody>
+          <a:bodyPr/>
+          <a:p>
+            <a:r>
+              <a:rPr lang="x-none" altLang="en-US"/>
+              <a:t>3 - Qt</a:t>
+            </a:r>
+            <a:endParaRPr lang="x-none" altLang="en-US"/>
+          </a:p>
+        </p:txBody>
+      </p:sp>
+      <p:sp>
+        <p:nvSpPr>
+          <p:cNvPr id="3" name="Content Placeholder 2"/>
+          <p:cNvSpPr>
+            <a:spLocks noGrp="1"/>
+          </p:cNvSpPr>
+          <p:nvPr>
+            <p:ph idx="1"/>
+          </p:nvPr>
+        </p:nvSpPr>
+        <p:spPr/>
+        <p:txBody>
+          <a:bodyPr/>
+          <a:p>
+            <a:endParaRPr lang="en-US"/>
           </a:p>
         </p:txBody>
       </p:sp>
@@ -6897,17 +8275,17 @@
           <a:p>
             <a:r>
               <a:rPr lang="x-none" altLang="en-US"/>
-              <a:t>2 - Evolution de l'informatique </a:t>
+              <a:t>2 - Évolution de l'informatique </a:t>
             </a:r>
             <a:r>
               <a:rPr lang="en-US" altLang="x-none"/>
               <a:t>: </a:t>
             </a:r>
             <a:r>
-              <a:rPr lang="" altLang="en-US"/>
+              <a:rPr lang="en-US" altLang="en-US"/>
               <a:t>évolution des langages</a:t>
             </a:r>
-            <a:endParaRPr lang="" altLang="en-US"/>
+            <a:endParaRPr lang="en-US" altLang="en-US"/>
           </a:p>
         </p:txBody>
       </p:sp>
@@ -6929,40 +8307,40 @@
               <a:buNone/>
             </a:pPr>
             <a:r>
-              <a:rPr lang="" altLang="en-US" sz="2800"/>
+              <a:rPr lang="en-US" altLang="en-US" sz="2800"/>
               <a:t>Les langages informatiques ont évolué de manière à réutiliser un maximum de code. </a:t>
             </a:r>
-            <a:endParaRPr lang="" altLang="en-US" sz="2800"/>
+            <a:endParaRPr lang="en-US" altLang="en-US" sz="2800"/>
           </a:p>
           <a:p>
             <a:pPr marL="0" indent="0">
               <a:buNone/>
             </a:pPr>
             <a:r>
-              <a:rPr lang="" altLang="en-US" sz="2800"/>
-              <a:t>Cette évolution a permi de réduire considérablement les temps de développement.</a:t>
-            </a:r>
-            <a:endParaRPr lang="" altLang="en-US" sz="2800"/>
+              <a:rPr lang="en-US" altLang="en-US" sz="2800"/>
+              <a:t>Cette évolution a permis de réduire considérablement les temps de développement.</a:t>
+            </a:r>
+            <a:endParaRPr lang="en-US" altLang="en-US" sz="2800"/>
           </a:p>
           <a:p>
             <a:pPr marL="0" indent="0">
               <a:buNone/>
             </a:pPr>
             <a:r>
-              <a:rPr lang="" altLang="en-US" sz="2800"/>
+              <a:rPr lang="en-US" altLang="en-US" sz="2800"/>
               <a:t>En contrepartie, les langages informatiques s'éloignent de plus en plus l'architecture matérielle  </a:t>
             </a:r>
-            <a:endParaRPr lang="" altLang="en-US"/>
+            <a:endParaRPr lang="en-US" altLang="en-US"/>
           </a:p>
           <a:p>
             <a:pPr marL="0" indent="0">
               <a:buNone/>
             </a:pPr>
             <a:r>
-              <a:rPr lang="" altLang="en-US"/>
+              <a:rPr lang="en-US" altLang="en-US"/>
               <a:t> </a:t>
             </a:r>
-            <a:endParaRPr lang="" altLang="en-US"/>
+            <a:endParaRPr lang="en-US" altLang="en-US"/>
           </a:p>
         </p:txBody>
       </p:sp>
@@ -7029,17 +8407,17 @@
           <a:p>
             <a:r>
               <a:rPr lang="x-none" altLang="en-US"/>
-              <a:t>2 - Evolution de l'informatique </a:t>
+              <a:t>2 - Évolution de l'informatique </a:t>
             </a:r>
             <a:r>
               <a:rPr lang="en-US" altLang="x-none"/>
               <a:t>: </a:t>
             </a:r>
             <a:r>
-              <a:rPr lang="" altLang="en-US"/>
+              <a:rPr lang="en-US" altLang="en-US"/>
               <a:t>réduction de la taille du code source</a:t>
             </a:r>
-            <a:endParaRPr lang="" altLang="en-US"/>
+            <a:endParaRPr lang="en-US" altLang="en-US"/>
           </a:p>
         </p:txBody>
       </p:sp>
@@ -7061,7 +8439,7 @@
               <a:buNone/>
             </a:pPr>
             <a:r>
-              <a:rPr lang="" altLang="en-US" sz="2800"/>
+              <a:rPr lang="en-US" altLang="en-US" sz="2800"/>
               <a:t>Mettre ici un exemple : assembleur vs C</a:t>
             </a:r>
             <a:r>
@@ -7122,17 +8500,17 @@
           <a:p>
             <a:r>
               <a:rPr lang="x-none" altLang="en-US"/>
-              <a:t>2 - Evolution de l'informatique </a:t>
+              <a:t>2 - Évolution de l'informatique </a:t>
             </a:r>
             <a:r>
               <a:rPr lang="en-US" altLang="x-none"/>
               <a:t>: </a:t>
             </a:r>
             <a:r>
-              <a:rPr lang="" altLang="en-US"/>
+              <a:rPr lang="en-US" altLang="en-US"/>
               <a:t>réutilisation du préconçu</a:t>
             </a:r>
-            <a:endParaRPr lang="" altLang="en-US"/>
+            <a:endParaRPr lang="en-US" altLang="en-US"/>
           </a:p>
         </p:txBody>
       </p:sp>
@@ -7179,15 +8557,7 @@
           <a:p>
             <a:r>
               <a:rPr lang="en-US" altLang="en-US"/>
-              <a:t>Nécessité de posséder une bonne connaissance des objets </a:t>
-            </a:r>
-            <a:r>
-              <a:rPr lang="" altLang="en-US"/>
-              <a:t>(</a:t>
-            </a:r>
-            <a:r>
-              <a:rPr lang="en-US" altLang="en-US"/>
-              <a:t>programmes) achetés pour les réemployer</a:t>
+              <a:t>Nécessité de posséder une bonne connaissance des objets (programmes) achetés pour les réemployer</a:t>
             </a:r>
             <a:endParaRPr lang="en-US" altLang="en-US"/>
           </a:p>
@@ -7313,14 +8683,14 @@
                         <a:buNone/>
                       </a:pPr>
                       <a:r>
-                        <a:rPr lang="" altLang="en-US">
+                        <a:rPr lang="en-US" altLang="en-US">
                           <a:solidFill>
                             <a:schemeClr val="tx1"/>
                           </a:solidFill>
                         </a:rPr>
                         <a:t>Claude Delannoy</a:t>
                       </a:r>
-                      <a:endParaRPr lang="" altLang="en-US">
+                      <a:endParaRPr lang="en-US" altLang="en-US">
                         <a:solidFill>
                           <a:schemeClr val="tx1"/>
                         </a:solidFill>
@@ -7339,14 +8709,14 @@
                         <a:buNone/>
                       </a:pPr>
                       <a:r>
-                        <a:rPr lang="" altLang="en-US">
+                        <a:rPr lang="en-US" altLang="en-US">
                           <a:solidFill>
                             <a:schemeClr val="tx1"/>
                           </a:solidFill>
                         </a:rPr>
                         <a:t>Programmer en langage C++</a:t>
                       </a:r>
-                      <a:endParaRPr lang="" altLang="en-US">
+                      <a:endParaRPr lang="en-US" altLang="en-US">
                         <a:solidFill>
                           <a:schemeClr val="tx1"/>
                         </a:solidFill>
@@ -7365,14 +8735,14 @@
                         <a:buNone/>
                       </a:pPr>
                       <a:r>
-                        <a:rPr lang="" altLang="en-US">
+                        <a:rPr lang="en-US" altLang="en-US">
                           <a:solidFill>
                             <a:schemeClr val="tx1"/>
                           </a:solidFill>
                         </a:rPr>
                         <a:t>Eyrolles</a:t>
                       </a:r>
-                      <a:endParaRPr lang="" altLang="en-US">
+                      <a:endParaRPr lang="en-US" altLang="en-US">
                         <a:solidFill>
                           <a:schemeClr val="tx1"/>
                         </a:solidFill>
@@ -7393,10 +8763,10 @@
                         <a:buNone/>
                       </a:pPr>
                       <a:r>
-                        <a:rPr lang="" altLang="en-US"/>
+                        <a:rPr lang="en-US" altLang="en-US"/>
                         <a:t>Jean-Michel Réveillac</a:t>
                       </a:r>
-                      <a:endParaRPr lang="" altLang="en-US"/>
+                      <a:endParaRPr lang="en-US" altLang="en-US"/>
                     </a:p>
                   </a:txBody>
                   <a:tcPr>
@@ -7411,10 +8781,10 @@
                         <a:buNone/>
                       </a:pPr>
                       <a:r>
-                        <a:rPr lang="" altLang="en-US"/>
+                        <a:rPr lang="en-US" altLang="en-US"/>
                         <a:t>Mini manuel de C++</a:t>
                       </a:r>
-                      <a:endParaRPr lang="" altLang="en-US"/>
+                      <a:endParaRPr lang="en-US" altLang="en-US"/>
                     </a:p>
                   </a:txBody>
                   <a:tcPr>
@@ -7428,7 +8798,7 @@
                       <a:pPr>
                         <a:buNone/>
                       </a:pPr>
-                      <a:endParaRPr lang="" altLang="en-US"/>
+                      <a:endParaRPr lang="en-US" altLang="en-US"/>
                     </a:p>
                   </a:txBody>
                   <a:tcPr>
@@ -7445,10 +8815,10 @@
                         <a:buNone/>
                       </a:pPr>
                       <a:r>
-                        <a:rPr lang="" altLang="en-US"/>
+                        <a:rPr lang="en-US" altLang="en-US"/>
                         <a:t>Bjarne Stroustup</a:t>
                       </a:r>
-                      <a:endParaRPr lang="" altLang="en-US"/>
+                      <a:endParaRPr lang="en-US" altLang="en-US"/>
                     </a:p>
                   </a:txBody>
                   <a:tcPr>
@@ -7463,10 +8833,10 @@
                         <a:buNone/>
                       </a:pPr>
                       <a:r>
-                        <a:rPr lang="" altLang="en-US"/>
+                        <a:rPr lang="en-US" altLang="en-US"/>
                         <a:t>The C++ Programming Language (3rd Edition)</a:t>
                       </a:r>
-                      <a:endParaRPr lang="" altLang="en-US"/>
+                      <a:endParaRPr lang="en-US" altLang="en-US"/>
                     </a:p>
                   </a:txBody>
                   <a:tcPr>
@@ -7480,7 +8850,7 @@
                       <a:pPr>
                         <a:buNone/>
                       </a:pPr>
-                      <a:endParaRPr lang="" altLang="en-US"/>
+                      <a:endParaRPr lang="en-US" altLang="en-US"/>
                     </a:p>
                   </a:txBody>
                   <a:tcPr>
@@ -7514,10 +8884,10 @@
           </a:bodyPr>
           <a:p>
             <a:r>
-              <a:rPr lang="" altLang="en-US" sz="2400"/>
-              <a:t>LIvres : </a:t>
-            </a:r>
-            <a:endParaRPr lang="" altLang="en-US" sz="2400"/>
+              <a:rPr lang="en-US" altLang="en-US" sz="2400"/>
+              <a:t>Livres : </a:t>
+            </a:r>
+            <a:endParaRPr lang="en-US" altLang="en-US" sz="2400"/>
           </a:p>
         </p:txBody>
       </p:sp>
@@ -7543,12 +8913,8 @@
           </a:bodyPr>
           <a:p>
             <a:r>
-              <a:rPr lang="" altLang="en-US" sz="2400"/>
-              <a:t>Internet </a:t>
-            </a:r>
-            <a:r>
               <a:rPr lang="en-US" altLang="en-US" sz="2400"/>
-              <a:t>: </a:t>
+              <a:t>Internet : </a:t>
             </a:r>
             <a:endParaRPr lang="en-US" altLang="en-US" sz="2400"/>
           </a:p>
@@ -8729,4 +10095,263 @@
     </a:ext>
   </a:extLst>
 </a:theme>
+</file>
+
+<file path=ppt/theme/theme3.xml><?xml version="1.0" encoding="utf-8"?>
+<a:theme xmlns:a="http://schemas.openxmlformats.org/drawingml/2006/main" name="Office Theme">
+  <a:themeElements>
+    <a:clrScheme name="Office">
+      <a:dk1>
+        <a:sysClr val="windowText" lastClr="000000"/>
+      </a:dk1>
+      <a:lt1>
+        <a:sysClr val="window" lastClr="FFFFFF"/>
+      </a:lt1>
+      <a:dk2>
+        <a:srgbClr val="44546A"/>
+      </a:dk2>
+      <a:lt2>
+        <a:srgbClr val="E7E6E6"/>
+      </a:lt2>
+      <a:accent1>
+        <a:srgbClr val="5B9BD5"/>
+      </a:accent1>
+      <a:accent2>
+        <a:srgbClr val="ED7D31"/>
+      </a:accent2>
+      <a:accent3>
+        <a:srgbClr val="A5A5A5"/>
+      </a:accent3>
+      <a:accent4>
+        <a:srgbClr val="FFC000"/>
+      </a:accent4>
+      <a:accent5>
+        <a:srgbClr val="4472C4"/>
+      </a:accent5>
+      <a:accent6>
+        <a:srgbClr val="70AD47"/>
+      </a:accent6>
+      <a:hlink>
+        <a:srgbClr val="0563C1"/>
+      </a:hlink>
+      <a:folHlink>
+        <a:srgbClr val="954F72"/>
+      </a:folHlink>
+    </a:clrScheme>
+    <a:fontScheme name="Office">
+      <a:majorFont>
+        <a:latin typeface="Calibri Light"/>
+        <a:ea typeface=""/>
+        <a:cs typeface=""/>
+        <a:font script="Jpan" typeface="ＭＳ Ｐゴシック"/>
+        <a:font script="Hang" typeface="맑은 고딕"/>
+        <a:font script="Hans" typeface="宋体"/>
+        <a:font script="Hant" typeface="新細明體"/>
+        <a:font script="Arab" typeface="Times New Roman"/>
+        <a:font script="Hebr" typeface="Times New Roman"/>
+        <a:font script="Thai" typeface="Angsana New"/>
+        <a:font script="Ethi" typeface="Nyala"/>
+        <a:font script="Beng" typeface="Vrinda"/>
+        <a:font script="Gujr" typeface="Shruti"/>
+        <a:font script="Khmr" typeface="MoolBoran"/>
+        <a:font script="Knda" typeface="Tunga"/>
+        <a:font script="Guru" typeface="Raavi"/>
+        <a:font script="Cans" typeface="Euphemia"/>
+        <a:font script="Cher" typeface="Plantagenet Cherokee"/>
+        <a:font script="Yiii" typeface="Microsoft Yi Baiti"/>
+        <a:font script="Tibt" typeface="Microsoft Himalaya"/>
+        <a:font script="Thaa" typeface="MV Boli"/>
+        <a:font script="Deva" typeface="Mangal"/>
+        <a:font script="Telu" typeface="Gautami"/>
+        <a:font script="Taml" typeface="Latha"/>
+        <a:font script="Syrc" typeface="Estrangelo Edessa"/>
+        <a:font script="Orya" typeface="Kalinga"/>
+        <a:font script="Mlym" typeface="Kartika"/>
+        <a:font script="Laoo" typeface="DokChampa"/>
+        <a:font script="Sinh" typeface="Iskoola Pota"/>
+        <a:font script="Mong" typeface="Mongolian Baiti"/>
+        <a:font script="Viet" typeface="Times New Roman"/>
+        <a:font script="Uigh" typeface="Microsoft Uighur"/>
+        <a:font script="Geor" typeface="Sylfaen"/>
+      </a:majorFont>
+      <a:minorFont>
+        <a:latin typeface="Calibri"/>
+        <a:ea typeface=""/>
+        <a:cs typeface=""/>
+        <a:font script="Jpan" typeface="ＭＳ Ｐゴシック"/>
+        <a:font script="Hang" typeface="맑은 고딕"/>
+        <a:font script="Hans" typeface="宋体"/>
+        <a:font script="Hant" typeface="新細明體"/>
+        <a:font script="Arab" typeface="Arial"/>
+        <a:font script="Hebr" typeface="Arial"/>
+        <a:font script="Thai" typeface="Cordia New"/>
+        <a:font script="Ethi" typeface="Nyala"/>
+        <a:font script="Beng" typeface="Vrinda"/>
+        <a:font script="Gujr" typeface="Shruti"/>
+        <a:font script="Khmr" typeface="DaunPenh"/>
+        <a:font script="Knda" typeface="Tunga"/>
+        <a:font script="Guru" typeface="Raavi"/>
+        <a:font script="Cans" typeface="Euphemia"/>
+        <a:font script="Cher" typeface="Plantagenet Cherokee"/>
+        <a:font script="Yiii" typeface="Microsoft Yi Baiti"/>
+        <a:font script="Tibt" typeface="Microsoft Himalaya"/>
+        <a:font script="Thaa" typeface="MV Boli"/>
+        <a:font script="Deva" typeface="Mangal"/>
+        <a:font script="Telu" typeface="Gautami"/>
+        <a:font script="Taml" typeface="Latha"/>
+        <a:font script="Syrc" typeface="Estrangelo Edessa"/>
+        <a:font script="Orya" typeface="Kalinga"/>
+        <a:font script="Mlym" typeface="Kartika"/>
+        <a:font script="Laoo" typeface="DokChampa"/>
+        <a:font script="Sinh" typeface="Iskoola Pota"/>
+        <a:font script="Mong" typeface="Mongolian Baiti"/>
+        <a:font script="Viet" typeface="Arial"/>
+        <a:font script="Uigh" typeface="Microsoft Uighur"/>
+        <a:font script="Geor" typeface="Sylfaen"/>
+      </a:minorFont>
+    </a:fontScheme>
+    <a:fmtScheme name="Office">
+      <a:fillStyleLst>
+        <a:solidFill>
+          <a:schemeClr val="phClr"/>
+        </a:solidFill>
+        <a:gradFill rotWithShape="1">
+          <a:gsLst>
+            <a:gs pos="0">
+              <a:schemeClr val="phClr">
+                <a:lumMod val="110000"/>
+                <a:satMod val="105000"/>
+                <a:tint val="67000"/>
+              </a:schemeClr>
+            </a:gs>
+            <a:gs pos="50000">
+              <a:schemeClr val="phClr">
+                <a:lumMod val="105000"/>
+                <a:satMod val="103000"/>
+                <a:tint val="73000"/>
+              </a:schemeClr>
+            </a:gs>
+            <a:gs pos="100000">
+              <a:schemeClr val="phClr">
+                <a:lumMod val="105000"/>
+                <a:satMod val="109000"/>
+                <a:tint val="81000"/>
+              </a:schemeClr>
+            </a:gs>
+          </a:gsLst>
+          <a:lin ang="5400000" scaled="0"/>
+        </a:gradFill>
+        <a:gradFill rotWithShape="1">
+          <a:gsLst>
+            <a:gs pos="0">
+              <a:schemeClr val="phClr">
+                <a:satMod val="103000"/>
+                <a:lumMod val="102000"/>
+                <a:tint val="94000"/>
+              </a:schemeClr>
+            </a:gs>
+            <a:gs pos="50000">
+              <a:schemeClr val="phClr">
+                <a:satMod val="110000"/>
+                <a:lumMod val="100000"/>
+                <a:shade val="100000"/>
+              </a:schemeClr>
+            </a:gs>
+            <a:gs pos="100000">
+              <a:schemeClr val="phClr">
+                <a:lumMod val="99000"/>
+                <a:satMod val="120000"/>
+                <a:shade val="78000"/>
+              </a:schemeClr>
+            </a:gs>
+          </a:gsLst>
+          <a:lin ang="5400000" scaled="0"/>
+        </a:gradFill>
+      </a:fillStyleLst>
+      <a:lnStyleLst>
+        <a:ln w="6350" cap="flat" cmpd="sng" algn="ctr">
+          <a:solidFill>
+            <a:schemeClr val="phClr"/>
+          </a:solidFill>
+          <a:prstDash val="solid"/>
+          <a:miter lim="800000"/>
+        </a:ln>
+        <a:ln w="12700" cap="flat" cmpd="sng" algn="ctr">
+          <a:solidFill>
+            <a:schemeClr val="phClr"/>
+          </a:solidFill>
+          <a:prstDash val="solid"/>
+          <a:miter lim="800000"/>
+        </a:ln>
+        <a:ln w="19050" cap="flat" cmpd="sng" algn="ctr">
+          <a:solidFill>
+            <a:schemeClr val="phClr"/>
+          </a:solidFill>
+          <a:prstDash val="solid"/>
+          <a:miter lim="800000"/>
+        </a:ln>
+      </a:lnStyleLst>
+      <a:effectStyleLst>
+        <a:effectStyle>
+          <a:effectLst/>
+        </a:effectStyle>
+        <a:effectStyle>
+          <a:effectLst/>
+        </a:effectStyle>
+        <a:effectStyle>
+          <a:effectLst>
+            <a:outerShdw blurRad="57150" dist="19050" dir="5400000" algn="ctr" rotWithShape="0">
+              <a:srgbClr val="000000">
+                <a:alpha val="63000"/>
+              </a:srgbClr>
+            </a:outerShdw>
+          </a:effectLst>
+        </a:effectStyle>
+      </a:effectStyleLst>
+      <a:bgFillStyleLst>
+        <a:solidFill>
+          <a:schemeClr val="phClr"/>
+        </a:solidFill>
+        <a:solidFill>
+          <a:schemeClr val="phClr">
+            <a:tint val="95000"/>
+            <a:satMod val="170000"/>
+          </a:schemeClr>
+        </a:solidFill>
+        <a:gradFill rotWithShape="1">
+          <a:gsLst>
+            <a:gs pos="0">
+              <a:schemeClr val="phClr">
+                <a:tint val="93000"/>
+                <a:satMod val="150000"/>
+                <a:shade val="98000"/>
+                <a:lumMod val="102000"/>
+              </a:schemeClr>
+            </a:gs>
+            <a:gs pos="50000">
+              <a:schemeClr val="phClr">
+                <a:tint val="98000"/>
+                <a:satMod val="130000"/>
+                <a:shade val="90000"/>
+                <a:lumMod val="103000"/>
+              </a:schemeClr>
+            </a:gs>
+            <a:gs pos="100000">
+              <a:schemeClr val="phClr">
+                <a:shade val="63000"/>
+                <a:satMod val="120000"/>
+              </a:schemeClr>
+            </a:gs>
+          </a:gsLst>
+          <a:lin ang="5400000" scaled="0"/>
+        </a:gradFill>
+      </a:bgFillStyleLst>
+    </a:fmtScheme>
+  </a:themeElements>
+  <a:extLst>
+    <a:ext uri="{05A4C25C-085E-4340-85A3-A5531E510DB2}">
+      <thm15:themeFamily xmlns:thm15="http://schemas.microsoft.com/office/thememl/2012/main" name="Office Theme" id="{62F939B6-93AF-4DB8-9C6B-D6C7DFDC589F}" vid="{4A3C46E8-61CC-4603-A589-7422A47A8E4A}"/>
+    </a:ext>
+  </a:extLst>
+</a:theme>
 </file>
</xml_diff>

<commit_message>
wip : first definition of class
</commit_message>
<xml_diff>
--- a/POO.pptx
+++ b/POO.pptx
@@ -5,10 +5,10 @@
     <p:sldMasterId id="2147483648" r:id="rId1"/>
   </p:sldMasterIdLst>
   <p:notesMasterIdLst>
-    <p:notesMasterId r:id="rId54"/>
+    <p:notesMasterId r:id="rId59"/>
   </p:notesMasterIdLst>
   <p:handoutMasterIdLst>
-    <p:handoutMasterId r:id="rId59"/>
+    <p:handoutMasterId r:id="rId64"/>
   </p:handoutMasterIdLst>
   <p:sldIdLst>
     <p:sldId id="256" r:id="rId3"/>
@@ -41,31 +41,36 @@
     <p:sldId id="270" r:id="rId30"/>
     <p:sldId id="272" r:id="rId31"/>
     <p:sldId id="273" r:id="rId32"/>
-    <p:sldId id="274" r:id="rId33"/>
-    <p:sldId id="276" r:id="rId34"/>
-    <p:sldId id="275" r:id="rId35"/>
-    <p:sldId id="277" r:id="rId36"/>
-    <p:sldId id="278" r:id="rId37"/>
-    <p:sldId id="279" r:id="rId38"/>
-    <p:sldId id="280" r:id="rId39"/>
-    <p:sldId id="281" r:id="rId40"/>
-    <p:sldId id="282" r:id="rId41"/>
-    <p:sldId id="283" r:id="rId42"/>
-    <p:sldId id="284" r:id="rId43"/>
-    <p:sldId id="286" r:id="rId44"/>
-    <p:sldId id="285" r:id="rId45"/>
-    <p:sldId id="287" r:id="rId46"/>
-    <p:sldId id="288" r:id="rId47"/>
-    <p:sldId id="289" r:id="rId48"/>
-    <p:sldId id="290" r:id="rId49"/>
-    <p:sldId id="291" r:id="rId50"/>
-    <p:sldId id="292" r:id="rId51"/>
-    <p:sldId id="293" r:id="rId52"/>
-    <p:sldId id="294" r:id="rId53"/>
-    <p:sldId id="296" r:id="rId55"/>
-    <p:sldId id="295" r:id="rId56"/>
-    <p:sldId id="297" r:id="rId57"/>
-    <p:sldId id="298" r:id="rId58"/>
+    <p:sldId id="386" r:id="rId33"/>
+    <p:sldId id="387" r:id="rId34"/>
+    <p:sldId id="274" r:id="rId35"/>
+    <p:sldId id="388" r:id="rId36"/>
+    <p:sldId id="389" r:id="rId37"/>
+    <p:sldId id="276" r:id="rId38"/>
+    <p:sldId id="275" r:id="rId39"/>
+    <p:sldId id="277" r:id="rId40"/>
+    <p:sldId id="391" r:id="rId41"/>
+    <p:sldId id="278" r:id="rId42"/>
+    <p:sldId id="279" r:id="rId43"/>
+    <p:sldId id="280" r:id="rId44"/>
+    <p:sldId id="281" r:id="rId45"/>
+    <p:sldId id="282" r:id="rId46"/>
+    <p:sldId id="283" r:id="rId47"/>
+    <p:sldId id="284" r:id="rId48"/>
+    <p:sldId id="286" r:id="rId49"/>
+    <p:sldId id="285" r:id="rId50"/>
+    <p:sldId id="287" r:id="rId51"/>
+    <p:sldId id="288" r:id="rId52"/>
+    <p:sldId id="289" r:id="rId53"/>
+    <p:sldId id="290" r:id="rId54"/>
+    <p:sldId id="291" r:id="rId55"/>
+    <p:sldId id="292" r:id="rId56"/>
+    <p:sldId id="293" r:id="rId57"/>
+    <p:sldId id="294" r:id="rId58"/>
+    <p:sldId id="296" r:id="rId60"/>
+    <p:sldId id="295" r:id="rId61"/>
+    <p:sldId id="297" r:id="rId62"/>
+    <p:sldId id="298" r:id="rId63"/>
   </p:sldIdLst>
   <p:sldSz cx="12192000" cy="6858000"/>
   <p:notesSz cx="7103745" cy="10234295"/>
@@ -211,7 +216,11 @@
             <p14:sldId id="270"/>
             <p14:sldId id="272"/>
             <p14:sldId id="273"/>
+            <p14:sldId id="386"/>
+            <p14:sldId id="387"/>
             <p14:sldId id="274"/>
+            <p14:sldId id="388"/>
+            <p14:sldId id="389"/>
           </p14:sldIdLst>
         </p14:section>
         <p14:section name="Introduction à la notion d'objet" id="{e4d80354-9bc9-4725-a55c-369371e72566}">
@@ -219,6 +228,7 @@
             <p14:sldId id="276"/>
             <p14:sldId id="275"/>
             <p14:sldId id="277"/>
+            <p14:sldId id="391"/>
             <p14:sldId id="278"/>
             <p14:sldId id="279"/>
             <p14:sldId id="280"/>
@@ -6598,7 +6608,7 @@
           <a:p>
             <a:r>
               <a:rPr lang="x-none" altLang="en-US"/>
-              <a:t>3 - Les constantes</a:t>
+              <a:t>3 - Les constantes - Définition</a:t>
             </a:r>
             <a:endParaRPr lang="x-none" altLang="en-US"/>
           </a:p>
@@ -6614,14 +6624,61 @@
             <p:ph idx="1"/>
           </p:nvPr>
         </p:nvSpPr>
-        <p:spPr/>
-        <p:txBody>
-          <a:bodyPr/>
-          <a:p>
-            <a:endParaRPr lang="en-US"/>
-          </a:p>
-        </p:txBody>
-      </p:sp>
+        <p:spPr>
+          <a:xfrm>
+            <a:off x="609600" y="1174750"/>
+            <a:ext cx="10972800" cy="3627755"/>
+          </a:xfrm>
+        </p:spPr>
+        <p:txBody>
+          <a:bodyPr/>
+          <a:p>
+            <a:r>
+              <a:rPr lang="x-none" altLang="en-US"/>
+              <a:t>Le langage C ajoute la possibilité de déclarer des données non modifiable</a:t>
+            </a:r>
+            <a:endParaRPr lang="x-none" altLang="en-US"/>
+          </a:p>
+          <a:p>
+            <a:r>
+              <a:rPr lang="x-none" altLang="en-US"/>
+              <a:t>Les constantes permettent de remplacer la plupart des instruction de précompilation #define</a:t>
+            </a:r>
+            <a:endParaRPr lang="x-none" altLang="en-US"/>
+          </a:p>
+          <a:p>
+            <a:r>
+              <a:rPr lang="x-none" altLang="en-US"/>
+              <a:t>Le mot clé “const” est utilisé pour déclarer une telle donnée</a:t>
+            </a:r>
+            <a:endParaRPr lang="x-none" altLang="en-US"/>
+          </a:p>
+        </p:txBody>
+      </p:sp>
+      <p:pic>
+        <p:nvPicPr>
+          <p:cNvPr id="5" name="Picture 4"/>
+          <p:cNvPicPr>
+            <a:picLocks noChangeAspect="1"/>
+          </p:cNvPicPr>
+          <p:nvPr/>
+        </p:nvPicPr>
+        <p:blipFill>
+          <a:blip r:embed="rId1"/>
+          <a:stretch>
+            <a:fillRect/>
+          </a:stretch>
+        </p:blipFill>
+        <p:spPr>
+          <a:xfrm>
+            <a:off x="4167505" y="5017770"/>
+            <a:ext cx="3856990" cy="552450"/>
+          </a:xfrm>
+          <a:prstGeom prst="rect">
+            <a:avLst/>
+          </a:prstGeom>
+        </p:spPr>
+      </p:pic>
     </p:spTree>
   </p:cSld>
   <p:clrMapOvr>
@@ -6656,7 +6713,7 @@
           <a:p>
             <a:r>
               <a:rPr lang="x-none" altLang="en-US"/>
-              <a:t>4 - Les espaces de nommage</a:t>
+              <a:t>3 - Les constantes - Application</a:t>
             </a:r>
             <a:endParaRPr lang="x-none" altLang="en-US"/>
           </a:p>
@@ -6664,19 +6721,192 @@
       </p:sp>
       <p:sp>
         <p:nvSpPr>
-          <p:cNvPr id="3" name="Content Placeholder 2"/>
-          <p:cNvSpPr>
-            <a:spLocks noGrp="1"/>
-          </p:cNvSpPr>
+          <p:cNvPr id="4" name="Text Placeholder 3"/>
+          <p:cNvSpPr>
+            <a:spLocks noGrp="1"/>
+          </p:cNvSpPr>
+          <p:nvPr>
+            <p:ph type="body" sz="half" idx="2"/>
+          </p:nvPr>
+        </p:nvSpPr>
+        <p:spPr>
+          <a:xfrm>
+            <a:off x="840317" y="2550795"/>
+            <a:ext cx="3932767" cy="3811588"/>
+          </a:xfrm>
+        </p:spPr>
+        <p:txBody>
+          <a:bodyPr/>
+          <a:p>
+            <a:pPr marL="285750" indent="-285750">
+              <a:buFont typeface="Arial" panose="02080604020202020204" pitchFamily="34" charset="0"/>
+              <a:buChar char="•"/>
+            </a:pPr>
+            <a:endParaRPr lang="x-none" altLang="en-US" sz="2000"/>
+          </a:p>
+          <a:p>
+            <a:pPr marL="285750" indent="-285750">
+              <a:buFont typeface="Arial" panose="02080604020202020204" pitchFamily="34" charset="0"/>
+              <a:buChar char="•"/>
+            </a:pPr>
+            <a:r>
+              <a:rPr lang="x-none" altLang="en-US" sz="2000"/>
+              <a:t>Permet de s'assurer qu'une variable ne soit pas modifiée</a:t>
+            </a:r>
+            <a:endParaRPr lang="x-none" altLang="en-US" sz="2000"/>
+          </a:p>
+          <a:p>
+            <a:pPr marL="285750" indent="-285750">
+              <a:buFont typeface="Arial" panose="02080604020202020204" pitchFamily="34" charset="0"/>
+              <a:buChar char="•"/>
+            </a:pPr>
+            <a:endParaRPr lang="x-none" altLang="en-US" sz="2000"/>
+          </a:p>
+          <a:p>
+            <a:pPr marL="285750" indent="-285750">
+              <a:buFont typeface="Arial" panose="02080604020202020204" pitchFamily="34" charset="0"/>
+              <a:buChar char="•"/>
+            </a:pPr>
+            <a:r>
+              <a:rPr lang="x-none" altLang="en-US" sz="2000"/>
+              <a:t>Ici a et b étant des pointeurs, leur contenus ne doit pas changer</a:t>
+            </a:r>
+            <a:endParaRPr lang="x-none" altLang="en-US" sz="2000"/>
+          </a:p>
+        </p:txBody>
+      </p:sp>
+      <p:pic>
+        <p:nvPicPr>
+          <p:cNvPr id="6" name="Content Placeholder 5"/>
+          <p:cNvPicPr>
+            <a:picLocks noChangeAspect="1"/>
+          </p:cNvPicPr>
           <p:nvPr>
             <p:ph idx="1"/>
           </p:nvPr>
-        </p:nvSpPr>
-        <p:spPr/>
-        <p:txBody>
-          <a:bodyPr/>
-          <a:p>
-            <a:endParaRPr lang="en-US"/>
+        </p:nvPicPr>
+        <p:blipFill>
+          <a:blip r:embed="rId1"/>
+          <a:stretch>
+            <a:fillRect/>
+          </a:stretch>
+        </p:blipFill>
+        <p:spPr>
+          <a:xfrm>
+            <a:off x="5227320" y="3274695"/>
+            <a:ext cx="6172200" cy="1289050"/>
+          </a:xfrm>
+          <a:prstGeom prst="rect">
+            <a:avLst/>
+          </a:prstGeom>
+        </p:spPr>
+      </p:pic>
+      <p:cxnSp>
+        <p:nvCxnSpPr>
+          <p:cNvPr id="7" name="Straight Connector 6"/>
+          <p:cNvCxnSpPr/>
+          <p:nvPr/>
+        </p:nvCxnSpPr>
+        <p:spPr>
+          <a:xfrm>
+            <a:off x="5864860" y="3877945"/>
+            <a:ext cx="1337945" cy="0"/>
+          </a:xfrm>
+          <a:prstGeom prst="line">
+            <a:avLst/>
+          </a:prstGeom>
+          <a:gradFill rotWithShape="0">
+            <a:gsLst>
+              <a:gs pos="0">
+                <a:schemeClr val="accent1"/>
+              </a:gs>
+              <a:gs pos="100000">
+                <a:schemeClr val="accent2"/>
+              </a:gs>
+            </a:gsLst>
+            <a:lin ang="5400000" scaled="1"/>
+          </a:gradFill>
+          <a:ln w="28575" cap="flat" cmpd="sng" algn="ctr">
+            <a:solidFill>
+              <a:srgbClr val="FF0000"/>
+            </a:solidFill>
+            <a:prstDash val="sysDot"/>
+            <a:round/>
+            <a:headEnd type="none" w="med" len="med"/>
+            <a:tailEnd type="none" w="med" len="med"/>
+          </a:ln>
+        </p:spPr>
+      </p:cxnSp>
+      <p:cxnSp>
+        <p:nvCxnSpPr>
+          <p:cNvPr id="8" name="Straight Arrow Connector 7"/>
+          <p:cNvCxnSpPr/>
+          <p:nvPr/>
+        </p:nvCxnSpPr>
+        <p:spPr>
+          <a:xfrm flipH="1">
+            <a:off x="6972300" y="2288540"/>
+            <a:ext cx="899160" cy="1589405"/>
+          </a:xfrm>
+          <a:prstGeom prst="straightConnector1">
+            <a:avLst/>
+          </a:prstGeom>
+          <a:gradFill rotWithShape="0">
+            <a:gsLst>
+              <a:gs pos="0">
+                <a:schemeClr val="accent1"/>
+              </a:gs>
+              <a:gs pos="100000">
+                <a:schemeClr val="accent2"/>
+              </a:gs>
+            </a:gsLst>
+            <a:lin ang="5400000" scaled="1"/>
+          </a:gradFill>
+          <a:ln w="15875" cap="flat" cmpd="sng" algn="ctr">
+            <a:solidFill>
+              <a:srgbClr val="FF0000"/>
+            </a:solidFill>
+            <a:prstDash val="solid"/>
+            <a:round/>
+            <a:headEnd type="none" w="med" len="med"/>
+            <a:tailEnd type="arrow" w="med" len="med"/>
+          </a:ln>
+        </p:spPr>
+      </p:cxnSp>
+      <p:sp>
+        <p:nvSpPr>
+          <p:cNvPr id="9" name="Text Box 8"/>
+          <p:cNvSpPr txBox="1"/>
+          <p:nvPr/>
+        </p:nvSpPr>
+        <p:spPr>
+          <a:xfrm>
+            <a:off x="6849110" y="1817370"/>
+            <a:ext cx="2929255" cy="398780"/>
+          </a:xfrm>
+          <a:prstGeom prst="rect">
+            <a:avLst/>
+          </a:prstGeom>
+          <a:noFill/>
+        </p:spPr>
+        <p:txBody>
+          <a:bodyPr wrap="none" rtlCol="0">
+            <a:spAutoFit/>
+          </a:bodyPr>
+          <a:p>
+            <a:r>
+              <a:rPr lang="x-none" altLang="en-US" sz="2000">
+                <a:solidFill>
+                  <a:srgbClr val="FF0000"/>
+                </a:solidFill>
+              </a:rPr>
+              <a:t>Erreur de compilation</a:t>
+            </a:r>
+            <a:endParaRPr lang="x-none" altLang="en-US" sz="2000">
+              <a:solidFill>
+                <a:srgbClr val="FF0000"/>
+              </a:solidFill>
+            </a:endParaRPr>
           </a:p>
         </p:txBody>
       </p:sp>
@@ -6700,7 +6930,7 @@
       <p:grpSpPr/>
       <p:sp>
         <p:nvSpPr>
-          <p:cNvPr id="4" name="Title 3"/>
+          <p:cNvPr id="2" name="Title 1"/>
           <p:cNvSpPr>
             <a:spLocks noGrp="1"/>
           </p:cNvSpPr>
@@ -6714,7 +6944,7 @@
           <a:p>
             <a:r>
               <a:rPr lang="x-none" altLang="en-US"/>
-              <a:t>IV - Introduction à la notion d'objet</a:t>
+              <a:t>3 - Les constantes - Pointeurs</a:t>
             </a:r>
             <a:endParaRPr lang="x-none" altLang="en-US"/>
           </a:p>
@@ -6722,22 +6952,64 @@
       </p:sp>
       <p:sp>
         <p:nvSpPr>
-          <p:cNvPr id="5" name="Text Placeholder 4"/>
-          <p:cNvSpPr>
-            <a:spLocks noGrp="1"/>
-          </p:cNvSpPr>
-          <p:nvPr>
-            <p:ph type="body" idx="1"/>
-          </p:nvPr>
-        </p:nvSpPr>
-        <p:spPr/>
-        <p:txBody>
-          <a:bodyPr/>
-          <a:p>
-            <a:endParaRPr lang="en-US"/>
-          </a:p>
-        </p:txBody>
-      </p:sp>
+          <p:cNvPr id="3" name="Content Placeholder 2"/>
+          <p:cNvSpPr/>
+          <p:nvPr>
+            <p:ph idx="1"/>
+          </p:nvPr>
+        </p:nvSpPr>
+        <p:spPr>
+          <a:xfrm>
+            <a:off x="609600" y="1174750"/>
+            <a:ext cx="10972800" cy="830580"/>
+          </a:xfrm>
+        </p:spPr>
+        <p:txBody>
+          <a:bodyPr/>
+          <a:p>
+            <a:r>
+              <a:rPr lang="x-none" altLang="en-US"/>
+              <a:t>Le cas des pointeurs est un peu particulier : </a:t>
+            </a:r>
+            <a:endParaRPr lang="x-none" altLang="en-US"/>
+          </a:p>
+          <a:p>
+            <a:pPr lvl="1"/>
+            <a:r>
+              <a:rPr lang="x-none" altLang="en-US" sz="2800"/>
+              <a:t>Il est possible de rendre constant le pointeur ou la valeur</a:t>
+            </a:r>
+            <a:endParaRPr lang="x-none" altLang="en-US"/>
+          </a:p>
+          <a:p>
+            <a:endParaRPr lang="x-none" altLang="en-US"/>
+          </a:p>
+        </p:txBody>
+      </p:sp>
+      <p:pic>
+        <p:nvPicPr>
+          <p:cNvPr id="5" name="Picture 4"/>
+          <p:cNvPicPr>
+            <a:picLocks noChangeAspect="1"/>
+          </p:cNvPicPr>
+          <p:nvPr/>
+        </p:nvPicPr>
+        <p:blipFill>
+          <a:blip r:embed="rId1"/>
+          <a:stretch>
+            <a:fillRect/>
+          </a:stretch>
+        </p:blipFill>
+        <p:spPr>
+          <a:xfrm>
+            <a:off x="609600" y="2747645"/>
+            <a:ext cx="8414385" cy="2875280"/>
+          </a:xfrm>
+          <a:prstGeom prst="rect">
+            <a:avLst/>
+          </a:prstGeom>
+        </p:spPr>
+      </p:pic>
     </p:spTree>
   </p:cSld>
   <p:clrMapOvr>
@@ -6772,7 +7044,7 @@
           <a:p>
             <a:r>
               <a:rPr lang="x-none" altLang="en-US"/>
-              <a:t>1 - Les Objets</a:t>
+              <a:t>4 - Les espaces de nom - Définition</a:t>
             </a:r>
             <a:endParaRPr lang="x-none" altLang="en-US"/>
           </a:p>
@@ -6788,14 +7060,57 @@
             <p:ph idx="1"/>
           </p:nvPr>
         </p:nvSpPr>
-        <p:spPr/>
-        <p:txBody>
-          <a:bodyPr/>
-          <a:p>
-            <a:endParaRPr lang="en-US"/>
-          </a:p>
-        </p:txBody>
-      </p:sp>
+        <p:spPr>
+          <a:xfrm>
+            <a:off x="609600" y="1174750"/>
+            <a:ext cx="10972800" cy="2946400"/>
+          </a:xfrm>
+        </p:spPr>
+        <p:txBody>
+          <a:bodyPr/>
+          <a:p>
+            <a:r>
+              <a:rPr lang="x-none" altLang="en-US"/>
+              <a:t>Le C++ offre la possibilité de diviser le code en différents espaces de nom</a:t>
+            </a:r>
+            <a:endParaRPr lang="x-none" altLang="en-US"/>
+          </a:p>
+          <a:p>
+            <a:endParaRPr lang="x-none" altLang="en-US"/>
+          </a:p>
+          <a:p>
+            <a:r>
+              <a:rPr lang="x-none" altLang="en-US"/>
+              <a:t>Un espace de nom est déclaré de la manière suivante : </a:t>
+            </a:r>
+            <a:endParaRPr lang="x-none" altLang="en-US"/>
+          </a:p>
+        </p:txBody>
+      </p:sp>
+      <p:pic>
+        <p:nvPicPr>
+          <p:cNvPr id="4" name="Picture 3"/>
+          <p:cNvPicPr>
+            <a:picLocks noChangeAspect="1"/>
+          </p:cNvPicPr>
+          <p:nvPr/>
+        </p:nvPicPr>
+        <p:blipFill>
+          <a:blip r:embed="rId1"/>
+          <a:stretch>
+            <a:fillRect/>
+          </a:stretch>
+        </p:blipFill>
+        <p:spPr>
+          <a:xfrm>
+            <a:off x="3757930" y="4562475"/>
+            <a:ext cx="4676140" cy="1000125"/>
+          </a:xfrm>
+          <a:prstGeom prst="rect">
+            <a:avLst/>
+          </a:prstGeom>
+        </p:spPr>
+      </p:pic>
     </p:spTree>
   </p:cSld>
   <p:clrMapOvr>
@@ -6830,7 +7145,7 @@
           <a:p>
             <a:r>
               <a:rPr lang="x-none" altLang="en-US"/>
-              <a:t>2 - Structure des classes</a:t>
+              <a:t>4 - Les espaces de nom - Utilisation</a:t>
             </a:r>
             <a:endParaRPr lang="x-none" altLang="en-US"/>
           </a:p>
@@ -6846,14 +7161,55 @@
             <p:ph idx="1"/>
           </p:nvPr>
         </p:nvSpPr>
-        <p:spPr/>
-        <p:txBody>
-          <a:bodyPr/>
-          <a:p>
-            <a:endParaRPr lang="en-US"/>
-          </a:p>
-        </p:txBody>
-      </p:sp>
+        <p:spPr>
+          <a:xfrm>
+            <a:off x="609600" y="1174750"/>
+            <a:ext cx="4658360" cy="1664335"/>
+          </a:xfrm>
+        </p:spPr>
+        <p:txBody>
+          <a:bodyPr/>
+          <a:p>
+            <a:r>
+              <a:rPr lang="x-none" altLang="en-US"/>
+              <a:t>Ce système permet d'éviter les conflits de noms</a:t>
+            </a:r>
+            <a:endParaRPr lang="x-none" altLang="en-US"/>
+          </a:p>
+          <a:p>
+            <a:pPr lvl="1"/>
+            <a:r>
+              <a:rPr lang="x-none" altLang="en-US"/>
+              <a:t>Par exemple, une fonction qui s'appelerait “open” aurait de grande chance de d'avoir un homonyme </a:t>
+            </a:r>
+            <a:endParaRPr lang="x-none" altLang="en-US"/>
+          </a:p>
+        </p:txBody>
+      </p:sp>
+      <p:pic>
+        <p:nvPicPr>
+          <p:cNvPr id="6" name="Picture 5"/>
+          <p:cNvPicPr>
+            <a:picLocks noChangeAspect="1"/>
+          </p:cNvPicPr>
+          <p:nvPr/>
+        </p:nvPicPr>
+        <p:blipFill>
+          <a:blip r:embed="rId1"/>
+          <a:stretch>
+            <a:fillRect/>
+          </a:stretch>
+        </p:blipFill>
+        <p:spPr>
+          <a:xfrm>
+            <a:off x="6420485" y="934085"/>
+            <a:ext cx="4504690" cy="5647690"/>
+          </a:xfrm>
+          <a:prstGeom prst="rect">
+            <a:avLst/>
+          </a:prstGeom>
+        </p:spPr>
+      </p:pic>
     </p:spTree>
   </p:cSld>
   <p:clrMapOvr>
@@ -6888,7 +7244,7 @@
           <a:p>
             <a:r>
               <a:rPr lang="x-none" altLang="en-US"/>
-              <a:t>3 - Instanciation des classes</a:t>
+              <a:t>4 - Les espaces de nom - mot clé “using”</a:t>
             </a:r>
             <a:endParaRPr lang="x-none" altLang="en-US"/>
           </a:p>
@@ -6904,14 +7260,47 @@
             <p:ph idx="1"/>
           </p:nvPr>
         </p:nvSpPr>
-        <p:spPr/>
-        <p:txBody>
-          <a:bodyPr/>
-          <a:p>
-            <a:endParaRPr lang="en-US"/>
-          </a:p>
-        </p:txBody>
-      </p:sp>
+        <p:spPr>
+          <a:xfrm>
+            <a:off x="609600" y="1174750"/>
+            <a:ext cx="5206365" cy="4712335"/>
+          </a:xfrm>
+        </p:spPr>
+        <p:txBody>
+          <a:bodyPr/>
+          <a:p>
+            <a:r>
+              <a:rPr lang="x-none" altLang="en-US"/>
+              <a:t>Le mot clé “using” permet de signaler que l'on va utiliser un espace de nomage </a:t>
+            </a:r>
+            <a:endParaRPr lang="x-none" altLang="en-US"/>
+          </a:p>
+        </p:txBody>
+      </p:sp>
+      <p:pic>
+        <p:nvPicPr>
+          <p:cNvPr id="6" name="Picture 5"/>
+          <p:cNvPicPr>
+            <a:picLocks noChangeAspect="1"/>
+          </p:cNvPicPr>
+          <p:nvPr/>
+        </p:nvPicPr>
+        <p:blipFill>
+          <a:blip r:embed="rId1"/>
+          <a:stretch>
+            <a:fillRect/>
+          </a:stretch>
+        </p:blipFill>
+        <p:spPr>
+          <a:xfrm>
+            <a:off x="6747510" y="1906270"/>
+            <a:ext cx="3761740" cy="3856990"/>
+          </a:xfrm>
+          <a:prstGeom prst="rect">
+            <a:avLst/>
+          </a:prstGeom>
+        </p:spPr>
+      </p:pic>
     </p:spTree>
   </p:cSld>
   <p:clrMapOvr>
@@ -6932,7 +7321,7 @@
       <p:grpSpPr/>
       <p:sp>
         <p:nvSpPr>
-          <p:cNvPr id="2" name="Title 1"/>
+          <p:cNvPr id="4" name="Title 3"/>
           <p:cNvSpPr>
             <a:spLocks noGrp="1"/>
           </p:cNvSpPr>
@@ -6946,7 +7335,7 @@
           <a:p>
             <a:r>
               <a:rPr lang="x-none" altLang="en-US"/>
-              <a:t>4 - Bonnes manières</a:t>
+              <a:t>IV - Introduction à la notion d'objet</a:t>
             </a:r>
             <a:endParaRPr lang="x-none" altLang="en-US"/>
           </a:p>
@@ -6954,12 +7343,12 @@
       </p:sp>
       <p:sp>
         <p:nvSpPr>
-          <p:cNvPr id="3" name="Content Placeholder 2"/>
-          <p:cNvSpPr>
-            <a:spLocks noGrp="1"/>
-          </p:cNvSpPr>
-          <p:nvPr>
-            <p:ph idx="1"/>
+          <p:cNvPr id="5" name="Text Placeholder 4"/>
+          <p:cNvSpPr>
+            <a:spLocks noGrp="1"/>
+          </p:cNvSpPr>
+          <p:nvPr>
+            <p:ph type="body" idx="1"/>
           </p:nvPr>
         </p:nvSpPr>
         <p:spPr/>
@@ -7004,7 +7393,7 @@
           <a:p>
             <a:r>
               <a:rPr lang="x-none" altLang="en-US"/>
-              <a:t>5 - Le constructeur</a:t>
+              <a:t>1 - Les Objets - Définition</a:t>
             </a:r>
             <a:endParaRPr lang="x-none" altLang="en-US"/>
           </a:p>
@@ -7020,14 +7409,57 @@
             <p:ph idx="1"/>
           </p:nvPr>
         </p:nvSpPr>
-        <p:spPr/>
-        <p:txBody>
-          <a:bodyPr/>
-          <a:p>
-            <a:endParaRPr lang="en-US"/>
-          </a:p>
-        </p:txBody>
-      </p:sp>
+        <p:spPr>
+          <a:xfrm>
+            <a:off x="609600" y="1087120"/>
+            <a:ext cx="10972800" cy="2827020"/>
+          </a:xfrm>
+        </p:spPr>
+        <p:txBody>
+          <a:bodyPr/>
+          <a:p>
+            <a:endParaRPr lang="x-none" altLang="en-US"/>
+          </a:p>
+          <a:p>
+            <a:r>
+              <a:rPr lang="x-none" altLang="en-US"/>
+              <a:t>Un objet est la définition d'un objet ou d'un concept</a:t>
+            </a:r>
+            <a:endParaRPr lang="x-none" altLang="en-US"/>
+          </a:p>
+          <a:p>
+            <a:r>
+              <a:rPr lang="x-none" altLang="en-US"/>
+              <a:t>Cette définition est constituée d'informations et de mécanismes</a:t>
+            </a:r>
+            <a:endParaRPr lang="x-none" altLang="en-US"/>
+          </a:p>
+        </p:txBody>
+      </p:sp>
+      <p:pic>
+        <p:nvPicPr>
+          <p:cNvPr id="6" name="Picture 5" descr="objects"/>
+          <p:cNvPicPr>
+            <a:picLocks noChangeAspect="1"/>
+          </p:cNvPicPr>
+          <p:nvPr/>
+        </p:nvPicPr>
+        <p:blipFill>
+          <a:blip r:embed="rId1"/>
+          <a:stretch>
+            <a:fillRect/>
+          </a:stretch>
+        </p:blipFill>
+        <p:spPr>
+          <a:xfrm>
+            <a:off x="1878330" y="3914140"/>
+            <a:ext cx="8435975" cy="2334895"/>
+          </a:xfrm>
+          <a:prstGeom prst="rect">
+            <a:avLst/>
+          </a:prstGeom>
+        </p:spPr>
+      </p:pic>
     </p:spTree>
   </p:cSld>
   <p:clrMapOvr>
@@ -7062,7 +7494,7 @@
           <a:p>
             <a:r>
               <a:rPr lang="x-none" altLang="en-US"/>
-              <a:t>6 - Destructeur</a:t>
+              <a:t>2 - Structure des classes</a:t>
             </a:r>
             <a:endParaRPr lang="x-none" altLang="en-US"/>
           </a:p>
@@ -7082,7 +7514,46 @@
         <p:txBody>
           <a:bodyPr/>
           <a:p>
-            <a:endParaRPr lang="en-US"/>
+            <a:r>
+              <a:rPr lang="x-none" altLang="en-US"/>
+              <a:t>Une classe est un type C++ permettant de décrire un objet</a:t>
+            </a:r>
+            <a:endParaRPr lang="x-none" altLang="en-US"/>
+          </a:p>
+          <a:p>
+            <a:r>
+              <a:rPr lang="x-none" altLang="en-US"/>
+              <a:t>Comme une structure, il regroupe plusieurs informations : </a:t>
+            </a:r>
+            <a:endParaRPr lang="x-none" altLang="en-US"/>
+          </a:p>
+          <a:p>
+            <a:pPr lvl="1"/>
+            <a:r>
+              <a:rPr lang="x-none" altLang="en-US"/>
+              <a:t>Des données, appelées “attributs”</a:t>
+            </a:r>
+            <a:endParaRPr lang="x-none" altLang="en-US"/>
+          </a:p>
+          <a:p>
+            <a:pPr lvl="1"/>
+            <a:r>
+              <a:rPr lang="x-none" altLang="en-US"/>
+              <a:t>Des fonctions, appelées “méthodes”</a:t>
+            </a:r>
+            <a:endParaRPr lang="x-none" altLang="en-US"/>
+          </a:p>
+          <a:p>
+            <a:pPr lvl="1"/>
+            <a:endParaRPr lang="x-none" altLang="en-US"/>
+          </a:p>
+          <a:p>
+            <a:pPr lvl="0"/>
+            <a:r>
+              <a:rPr lang="x-none" altLang="en-US"/>
+              <a:t>On associe donc à cet objet des données mais aussi des action (contrairement à une structure)</a:t>
+            </a:r>
+            <a:endParaRPr lang="x-none" altLang="en-US"/>
           </a:p>
         </p:txBody>
       </p:sp>
@@ -7120,7 +7591,7 @@
           <a:p>
             <a:r>
               <a:rPr lang="x-none" altLang="en-US"/>
-              <a:t>7 - Mot clé “static”</a:t>
+              <a:t>2 - Structure des classes - Définition</a:t>
             </a:r>
             <a:endParaRPr lang="x-none" altLang="en-US"/>
           </a:p>
@@ -7133,17 +7604,54 @@
             <a:spLocks noGrp="1"/>
           </p:cNvSpPr>
           <p:nvPr>
-            <p:ph idx="1"/>
-          </p:nvPr>
-        </p:nvSpPr>
-        <p:spPr/>
-        <p:txBody>
-          <a:bodyPr/>
-          <a:p>
-            <a:endParaRPr lang="en-US"/>
-          </a:p>
-        </p:txBody>
-      </p:sp>
+            <p:ph sz="half" idx="1"/>
+          </p:nvPr>
+        </p:nvSpPr>
+        <p:spPr/>
+        <p:txBody>
+          <a:bodyPr/>
+          <a:p>
+            <a:r>
+              <a:rPr lang="x-none" altLang="en-US"/>
+              <a:t>La déclaration d'une classe se fait de la manière suivante</a:t>
+            </a:r>
+            <a:endParaRPr lang="x-none" altLang="en-US"/>
+          </a:p>
+          <a:p>
+            <a:r>
+              <a:rPr lang="x-none" altLang="en-US"/>
+              <a:t> </a:t>
+            </a:r>
+            <a:endParaRPr lang="x-none" altLang="en-US"/>
+          </a:p>
+        </p:txBody>
+      </p:sp>
+      <p:pic>
+        <p:nvPicPr>
+          <p:cNvPr id="7" name="Content Placeholder 6"/>
+          <p:cNvPicPr>
+            <a:picLocks noChangeAspect="1"/>
+          </p:cNvPicPr>
+          <p:nvPr>
+            <p:ph sz="half" idx="2"/>
+          </p:nvPr>
+        </p:nvPicPr>
+        <p:blipFill>
+          <a:blip r:embed="rId1"/>
+          <a:stretch>
+            <a:fillRect/>
+          </a:stretch>
+        </p:blipFill>
+        <p:spPr>
+          <a:xfrm>
+            <a:off x="6787515" y="1442720"/>
+            <a:ext cx="4794885" cy="4416425"/>
+          </a:xfrm>
+          <a:prstGeom prst="rect">
+            <a:avLst/>
+          </a:prstGeom>
+        </p:spPr>
+      </p:pic>
     </p:spTree>
   </p:cSld>
   <p:clrMapOvr>
@@ -7254,7 +7762,7 @@
           <a:p>
             <a:r>
               <a:rPr lang="x-none" altLang="en-US"/>
-              <a:t>8 - Surcharge des fonctions</a:t>
+              <a:t>3 - Instanciation des classes</a:t>
             </a:r>
             <a:endParaRPr lang="x-none" altLang="en-US"/>
           </a:p>
@@ -7312,7 +7820,7 @@
           <a:p>
             <a:r>
               <a:rPr lang="x-none" altLang="en-US"/>
-              <a:t>9 - Surcharge des opérateurs</a:t>
+              <a:t>4 - Bonnes manières</a:t>
             </a:r>
             <a:endParaRPr lang="x-none" altLang="en-US"/>
           </a:p>
@@ -7356,7 +7864,7 @@
       <p:grpSpPr/>
       <p:sp>
         <p:nvSpPr>
-          <p:cNvPr id="4" name="Title 3"/>
+          <p:cNvPr id="2" name="Title 1"/>
           <p:cNvSpPr>
             <a:spLocks noGrp="1"/>
           </p:cNvSpPr>
@@ -7370,7 +7878,7 @@
           <a:p>
             <a:r>
               <a:rPr lang="x-none" altLang="en-US"/>
-              <a:t>V - Notions avancées</a:t>
+              <a:t>5 - Le constructeur</a:t>
             </a:r>
             <a:endParaRPr lang="x-none" altLang="en-US"/>
           </a:p>
@@ -7378,12 +7886,12 @@
       </p:sp>
       <p:sp>
         <p:nvSpPr>
-          <p:cNvPr id="5" name="Text Placeholder 4"/>
-          <p:cNvSpPr>
-            <a:spLocks noGrp="1"/>
-          </p:cNvSpPr>
-          <p:nvPr>
-            <p:ph type="body" idx="1"/>
+          <p:cNvPr id="3" name="Content Placeholder 2"/>
+          <p:cNvSpPr>
+            <a:spLocks noGrp="1"/>
+          </p:cNvSpPr>
+          <p:nvPr>
+            <p:ph idx="1"/>
           </p:nvPr>
         </p:nvSpPr>
         <p:spPr/>
@@ -7414,7 +7922,7 @@
       <p:grpSpPr/>
       <p:sp>
         <p:nvSpPr>
-          <p:cNvPr id="6" name="Title 5"/>
+          <p:cNvPr id="2" name="Title 1"/>
           <p:cNvSpPr>
             <a:spLocks noGrp="1"/>
           </p:cNvSpPr>
@@ -7428,7 +7936,7 @@
           <a:p>
             <a:r>
               <a:rPr lang="x-none" altLang="en-US"/>
-              <a:t>1 - Encapsulation des données</a:t>
+              <a:t>6 - Destructeur</a:t>
             </a:r>
             <a:endParaRPr lang="x-none" altLang="en-US"/>
           </a:p>
@@ -7436,7 +7944,7 @@
       </p:sp>
       <p:sp>
         <p:nvSpPr>
-          <p:cNvPr id="7" name="Content Placeholder 6"/>
+          <p:cNvPr id="3" name="Content Placeholder 2"/>
           <p:cNvSpPr>
             <a:spLocks noGrp="1"/>
           </p:cNvSpPr>
@@ -7486,7 +7994,7 @@
           <a:p>
             <a:r>
               <a:rPr lang="x-none" altLang="en-US"/>
-              <a:t>2 - Les droits d'accès</a:t>
+              <a:t>7 - Mot clé “static”</a:t>
             </a:r>
             <a:endParaRPr lang="x-none" altLang="en-US"/>
           </a:p>
@@ -7544,7 +8052,7 @@
           <a:p>
             <a:r>
               <a:rPr lang="x-none" altLang="en-US"/>
-              <a:t>3 - Héritage et dérivation</a:t>
+              <a:t>8 - Surcharge des fonctions</a:t>
             </a:r>
             <a:endParaRPr lang="x-none" altLang="en-US"/>
           </a:p>
@@ -7602,7 +8110,7 @@
           <a:p>
             <a:r>
               <a:rPr lang="x-none" altLang="en-US"/>
-              <a:t>4 - Héritage multiple</a:t>
+              <a:t>9 - Surcharge des opérateurs</a:t>
             </a:r>
             <a:endParaRPr lang="x-none" altLang="en-US"/>
           </a:p>
@@ -7646,7 +8154,7 @@
       <p:grpSpPr/>
       <p:sp>
         <p:nvSpPr>
-          <p:cNvPr id="2" name="Title 1"/>
+          <p:cNvPr id="4" name="Title 3"/>
           <p:cNvSpPr>
             <a:spLocks noGrp="1"/>
           </p:cNvSpPr>
@@ -7660,7 +8168,7 @@
           <a:p>
             <a:r>
               <a:rPr lang="x-none" altLang="en-US"/>
-              <a:t>5 - Compatibilité des classes</a:t>
+              <a:t>V - Notions avancées</a:t>
             </a:r>
             <a:endParaRPr lang="x-none" altLang="en-US"/>
           </a:p>
@@ -7668,12 +8176,12 @@
       </p:sp>
       <p:sp>
         <p:nvSpPr>
-          <p:cNvPr id="3" name="Content Placeholder 2"/>
-          <p:cNvSpPr>
-            <a:spLocks noGrp="1"/>
-          </p:cNvSpPr>
-          <p:nvPr>
-            <p:ph idx="1"/>
+          <p:cNvPr id="5" name="Text Placeholder 4"/>
+          <p:cNvSpPr>
+            <a:spLocks noGrp="1"/>
+          </p:cNvSpPr>
+          <p:nvPr>
+            <p:ph type="body" idx="1"/>
           </p:nvPr>
         </p:nvSpPr>
         <p:spPr/>
@@ -7704,7 +8212,7 @@
       <p:grpSpPr/>
       <p:sp>
         <p:nvSpPr>
-          <p:cNvPr id="2" name="Title 1"/>
+          <p:cNvPr id="6" name="Title 5"/>
           <p:cNvSpPr>
             <a:spLocks noGrp="1"/>
           </p:cNvSpPr>
@@ -7718,7 +8226,7 @@
           <a:p>
             <a:r>
               <a:rPr lang="x-none" altLang="en-US"/>
-              <a:t>6 - Classes abstraites</a:t>
+              <a:t>1 - Encapsulation des données</a:t>
             </a:r>
             <a:endParaRPr lang="x-none" altLang="en-US"/>
           </a:p>
@@ -7726,7 +8234,7 @@
       </p:sp>
       <p:sp>
         <p:nvSpPr>
-          <p:cNvPr id="3" name="Content Placeholder 2"/>
+          <p:cNvPr id="7" name="Content Placeholder 6"/>
           <p:cNvSpPr>
             <a:spLocks noGrp="1"/>
           </p:cNvSpPr>
@@ -7776,7 +8284,7 @@
           <a:p>
             <a:r>
               <a:rPr lang="x-none" altLang="en-US"/>
-              <a:t>7 - Exceptions</a:t>
+              <a:t>2 - Les droits d'accès</a:t>
             </a:r>
             <a:endParaRPr lang="x-none" altLang="en-US"/>
           </a:p>
@@ -7927,7 +8435,7 @@
           <a:p>
             <a:r>
               <a:rPr lang="x-none" altLang="en-US"/>
-              <a:t>8 - Flux</a:t>
+              <a:t>3 - Héritage et dérivation</a:t>
             </a:r>
             <a:endParaRPr lang="x-none" altLang="en-US"/>
           </a:p>
@@ -7985,7 +8493,7 @@
           <a:p>
             <a:r>
               <a:rPr lang="x-none" altLang="en-US"/>
-              <a:t>9 - Templates</a:t>
+              <a:t>4 - Héritage multiple</a:t>
             </a:r>
             <a:endParaRPr lang="x-none" altLang="en-US"/>
           </a:p>
@@ -8029,7 +8537,7 @@
       <p:grpSpPr/>
       <p:sp>
         <p:nvSpPr>
-          <p:cNvPr id="4" name="Title 3"/>
+          <p:cNvPr id="2" name="Title 1"/>
           <p:cNvSpPr>
             <a:spLocks noGrp="1"/>
           </p:cNvSpPr>
@@ -8043,7 +8551,7 @@
           <a:p>
             <a:r>
               <a:rPr lang="x-none" altLang="en-US"/>
-              <a:t>VI - Les bibliothèques</a:t>
+              <a:t>5 - Compatibilité des classes</a:t>
             </a:r>
             <a:endParaRPr lang="x-none" altLang="en-US"/>
           </a:p>
@@ -8051,12 +8559,12 @@
       </p:sp>
       <p:sp>
         <p:nvSpPr>
-          <p:cNvPr id="5" name="Text Placeholder 4"/>
-          <p:cNvSpPr>
-            <a:spLocks noGrp="1"/>
-          </p:cNvSpPr>
-          <p:nvPr>
-            <p:ph type="body" idx="1"/>
+          <p:cNvPr id="3" name="Content Placeholder 2"/>
+          <p:cNvSpPr>
+            <a:spLocks noGrp="1"/>
+          </p:cNvSpPr>
+          <p:nvPr>
+            <p:ph idx="1"/>
           </p:nvPr>
         </p:nvSpPr>
         <p:spPr/>
@@ -8087,7 +8595,7 @@
       <p:grpSpPr/>
       <p:sp>
         <p:nvSpPr>
-          <p:cNvPr id="4" name="Title 3"/>
+          <p:cNvPr id="2" name="Title 1"/>
           <p:cNvSpPr>
             <a:spLocks noGrp="1"/>
           </p:cNvSpPr>
@@ -8101,7 +8609,7 @@
           <a:p>
             <a:r>
               <a:rPr lang="x-none" altLang="en-US"/>
-              <a:t>1 - Librairie standard (STL)</a:t>
+              <a:t>6 - Classes abstraites</a:t>
             </a:r>
             <a:endParaRPr lang="x-none" altLang="en-US"/>
           </a:p>
@@ -8109,7 +8617,7 @@
       </p:sp>
       <p:sp>
         <p:nvSpPr>
-          <p:cNvPr id="6" name="Content Placeholder 5"/>
+          <p:cNvPr id="3" name="Content Placeholder 2"/>
           <p:cNvSpPr>
             <a:spLocks noGrp="1"/>
           </p:cNvSpPr>
@@ -8159,7 +8667,7 @@
           <a:p>
             <a:r>
               <a:rPr lang="x-none" altLang="en-US"/>
-              <a:t>2 - Les spécificités du C++11</a:t>
+              <a:t>7 - Exceptions</a:t>
             </a:r>
             <a:endParaRPr lang="x-none" altLang="en-US"/>
           </a:p>
@@ -8217,7 +8725,239 @@
           <a:p>
             <a:r>
               <a:rPr lang="x-none" altLang="en-US"/>
-              <a:t>3 - Qt</a:t>
+              <a:t>8 - Flux</a:t>
+            </a:r>
+            <a:endParaRPr lang="x-none" altLang="en-US"/>
+          </a:p>
+        </p:txBody>
+      </p:sp>
+      <p:sp>
+        <p:nvSpPr>
+          <p:cNvPr id="3" name="Content Placeholder 2"/>
+          <p:cNvSpPr>
+            <a:spLocks noGrp="1"/>
+          </p:cNvSpPr>
+          <p:nvPr>
+            <p:ph idx="1"/>
+          </p:nvPr>
+        </p:nvSpPr>
+        <p:spPr/>
+        <p:txBody>
+          <a:bodyPr/>
+          <a:p>
+            <a:endParaRPr lang="en-US"/>
+          </a:p>
+        </p:txBody>
+      </p:sp>
+    </p:spTree>
+  </p:cSld>
+  <p:clrMapOvr>
+    <a:masterClrMapping/>
+  </p:clrMapOvr>
+</p:sld>
+</file>
+
+<file path=ppt/slides/slide56.xml><?xml version="1.0" encoding="utf-8"?>
+<p:sld xmlns:a="http://schemas.openxmlformats.org/drawingml/2006/main" xmlns:r="http://schemas.openxmlformats.org/officeDocument/2006/relationships" xmlns:p="http://schemas.openxmlformats.org/presentationml/2006/main">
+  <p:cSld>
+    <p:spTree>
+      <p:nvGrpSpPr>
+        <p:cNvPr id="1" name=""/>
+        <p:cNvGrpSpPr/>
+        <p:nvPr/>
+      </p:nvGrpSpPr>
+      <p:grpSpPr/>
+      <p:sp>
+        <p:nvSpPr>
+          <p:cNvPr id="2" name="Title 1"/>
+          <p:cNvSpPr>
+            <a:spLocks noGrp="1"/>
+          </p:cNvSpPr>
+          <p:nvPr>
+            <p:ph type="title"/>
+          </p:nvPr>
+        </p:nvSpPr>
+        <p:spPr/>
+        <p:txBody>
+          <a:bodyPr/>
+          <a:p>
+            <a:r>
+              <a:rPr lang="x-none" altLang="en-US"/>
+              <a:t>9 - Templates</a:t>
+            </a:r>
+            <a:endParaRPr lang="x-none" altLang="en-US"/>
+          </a:p>
+        </p:txBody>
+      </p:sp>
+      <p:sp>
+        <p:nvSpPr>
+          <p:cNvPr id="3" name="Content Placeholder 2"/>
+          <p:cNvSpPr>
+            <a:spLocks noGrp="1"/>
+          </p:cNvSpPr>
+          <p:nvPr>
+            <p:ph idx="1"/>
+          </p:nvPr>
+        </p:nvSpPr>
+        <p:spPr/>
+        <p:txBody>
+          <a:bodyPr/>
+          <a:p>
+            <a:endParaRPr lang="en-US"/>
+          </a:p>
+        </p:txBody>
+      </p:sp>
+    </p:spTree>
+  </p:cSld>
+  <p:clrMapOvr>
+    <a:masterClrMapping/>
+  </p:clrMapOvr>
+</p:sld>
+</file>
+
+<file path=ppt/slides/slide57.xml><?xml version="1.0" encoding="utf-8"?>
+<p:sld xmlns:a="http://schemas.openxmlformats.org/drawingml/2006/main" xmlns:r="http://schemas.openxmlformats.org/officeDocument/2006/relationships" xmlns:p="http://schemas.openxmlformats.org/presentationml/2006/main">
+  <p:cSld>
+    <p:spTree>
+      <p:nvGrpSpPr>
+        <p:cNvPr id="1" name=""/>
+        <p:cNvGrpSpPr/>
+        <p:nvPr/>
+      </p:nvGrpSpPr>
+      <p:grpSpPr/>
+      <p:sp>
+        <p:nvSpPr>
+          <p:cNvPr id="4" name="Title 3"/>
+          <p:cNvSpPr>
+            <a:spLocks noGrp="1"/>
+          </p:cNvSpPr>
+          <p:nvPr>
+            <p:ph type="title"/>
+          </p:nvPr>
+        </p:nvSpPr>
+        <p:spPr/>
+        <p:txBody>
+          <a:bodyPr/>
+          <a:p>
+            <a:r>
+              <a:rPr lang="x-none" altLang="en-US"/>
+              <a:t>VI - Les bibliothèques</a:t>
+            </a:r>
+            <a:endParaRPr lang="x-none" altLang="en-US"/>
+          </a:p>
+        </p:txBody>
+      </p:sp>
+      <p:sp>
+        <p:nvSpPr>
+          <p:cNvPr id="5" name="Text Placeholder 4"/>
+          <p:cNvSpPr>
+            <a:spLocks noGrp="1"/>
+          </p:cNvSpPr>
+          <p:nvPr>
+            <p:ph type="body" idx="1"/>
+          </p:nvPr>
+        </p:nvSpPr>
+        <p:spPr/>
+        <p:txBody>
+          <a:bodyPr/>
+          <a:p>
+            <a:endParaRPr lang="en-US"/>
+          </a:p>
+        </p:txBody>
+      </p:sp>
+    </p:spTree>
+  </p:cSld>
+  <p:clrMapOvr>
+    <a:masterClrMapping/>
+  </p:clrMapOvr>
+</p:sld>
+</file>
+
+<file path=ppt/slides/slide58.xml><?xml version="1.0" encoding="utf-8"?>
+<p:sld xmlns:a="http://schemas.openxmlformats.org/drawingml/2006/main" xmlns:r="http://schemas.openxmlformats.org/officeDocument/2006/relationships" xmlns:p="http://schemas.openxmlformats.org/presentationml/2006/main">
+  <p:cSld>
+    <p:spTree>
+      <p:nvGrpSpPr>
+        <p:cNvPr id="1" name=""/>
+        <p:cNvGrpSpPr/>
+        <p:nvPr/>
+      </p:nvGrpSpPr>
+      <p:grpSpPr/>
+      <p:sp>
+        <p:nvSpPr>
+          <p:cNvPr id="4" name="Title 3"/>
+          <p:cNvSpPr>
+            <a:spLocks noGrp="1"/>
+          </p:cNvSpPr>
+          <p:nvPr>
+            <p:ph type="title"/>
+          </p:nvPr>
+        </p:nvSpPr>
+        <p:spPr/>
+        <p:txBody>
+          <a:bodyPr/>
+          <a:p>
+            <a:r>
+              <a:rPr lang="x-none" altLang="en-US"/>
+              <a:t>1 - Librairie standard (STL)</a:t>
+            </a:r>
+            <a:endParaRPr lang="x-none" altLang="en-US"/>
+          </a:p>
+        </p:txBody>
+      </p:sp>
+      <p:sp>
+        <p:nvSpPr>
+          <p:cNvPr id="6" name="Content Placeholder 5"/>
+          <p:cNvSpPr>
+            <a:spLocks noGrp="1"/>
+          </p:cNvSpPr>
+          <p:nvPr>
+            <p:ph idx="1"/>
+          </p:nvPr>
+        </p:nvSpPr>
+        <p:spPr/>
+        <p:txBody>
+          <a:bodyPr/>
+          <a:p>
+            <a:endParaRPr lang="en-US"/>
+          </a:p>
+        </p:txBody>
+      </p:sp>
+    </p:spTree>
+  </p:cSld>
+  <p:clrMapOvr>
+    <a:masterClrMapping/>
+  </p:clrMapOvr>
+</p:sld>
+</file>
+
+<file path=ppt/slides/slide59.xml><?xml version="1.0" encoding="utf-8"?>
+<p:sld xmlns:a="http://schemas.openxmlformats.org/drawingml/2006/main" xmlns:r="http://schemas.openxmlformats.org/officeDocument/2006/relationships" xmlns:p="http://schemas.openxmlformats.org/presentationml/2006/main">
+  <p:cSld>
+    <p:spTree>
+      <p:nvGrpSpPr>
+        <p:cNvPr id="1" name=""/>
+        <p:cNvGrpSpPr/>
+        <p:nvPr/>
+      </p:nvGrpSpPr>
+      <p:grpSpPr/>
+      <p:sp>
+        <p:nvSpPr>
+          <p:cNvPr id="2" name="Title 1"/>
+          <p:cNvSpPr>
+            <a:spLocks noGrp="1"/>
+          </p:cNvSpPr>
+          <p:nvPr>
+            <p:ph type="title"/>
+          </p:nvPr>
+        </p:nvSpPr>
+        <p:spPr/>
+        <p:txBody>
+          <a:bodyPr/>
+          <a:p>
+            <a:r>
+              <a:rPr lang="x-none" altLang="en-US"/>
+              <a:t>2 - Les spécificités du C++11</a:t>
             </a:r>
             <a:endParaRPr lang="x-none" altLang="en-US"/>
           </a:p>
@@ -8373,6 +9113,64 @@
           <a:effectLst/>
         </p:spPr>
       </p:pic>
+    </p:spTree>
+  </p:cSld>
+  <p:clrMapOvr>
+    <a:masterClrMapping/>
+  </p:clrMapOvr>
+</p:sld>
+</file>
+
+<file path=ppt/slides/slide60.xml><?xml version="1.0" encoding="utf-8"?>
+<p:sld xmlns:a="http://schemas.openxmlformats.org/drawingml/2006/main" xmlns:r="http://schemas.openxmlformats.org/officeDocument/2006/relationships" xmlns:p="http://schemas.openxmlformats.org/presentationml/2006/main">
+  <p:cSld>
+    <p:spTree>
+      <p:nvGrpSpPr>
+        <p:cNvPr id="1" name=""/>
+        <p:cNvGrpSpPr/>
+        <p:nvPr/>
+      </p:nvGrpSpPr>
+      <p:grpSpPr/>
+      <p:sp>
+        <p:nvSpPr>
+          <p:cNvPr id="2" name="Title 1"/>
+          <p:cNvSpPr>
+            <a:spLocks noGrp="1"/>
+          </p:cNvSpPr>
+          <p:nvPr>
+            <p:ph type="title"/>
+          </p:nvPr>
+        </p:nvSpPr>
+        <p:spPr/>
+        <p:txBody>
+          <a:bodyPr/>
+          <a:p>
+            <a:r>
+              <a:rPr lang="x-none" altLang="en-US"/>
+              <a:t>3 - Qt</a:t>
+            </a:r>
+            <a:endParaRPr lang="x-none" altLang="en-US"/>
+          </a:p>
+        </p:txBody>
+      </p:sp>
+      <p:sp>
+        <p:nvSpPr>
+          <p:cNvPr id="3" name="Content Placeholder 2"/>
+          <p:cNvSpPr>
+            <a:spLocks noGrp="1"/>
+          </p:cNvSpPr>
+          <p:nvPr>
+            <p:ph idx="1"/>
+          </p:nvPr>
+        </p:nvSpPr>
+        <p:spPr/>
+        <p:txBody>
+          <a:bodyPr/>
+          <a:p>
+            <a:endParaRPr lang="en-US"/>
+          </a:p>
+        </p:txBody>
+      </p:sp>
     </p:spTree>
   </p:cSld>
   <p:clrMapOvr>

</xml_diff>